<commit_message>
Update GUI part of presentation
</commit_message>
<xml_diff>
--- a/TeamWebProjectManagement/Praesentation/ProgrammierprojektSS2016.pptx
+++ b/TeamWebProjectManagement/Praesentation/ProgrammierprojektSS2016.pptx
@@ -24,12 +24,16 @@
     <p:sldId id="274" r:id="rId18"/>
     <p:sldId id="277" r:id="rId19"/>
     <p:sldId id="278" r:id="rId20"/>
-    <p:sldId id="276" r:id="rId21"/>
-    <p:sldId id="266" r:id="rId22"/>
-    <p:sldId id="267" r:id="rId23"/>
-    <p:sldId id="268" r:id="rId24"/>
-    <p:sldId id="269" r:id="rId25"/>
-    <p:sldId id="270" r:id="rId26"/>
+    <p:sldId id="280" r:id="rId21"/>
+    <p:sldId id="279" r:id="rId22"/>
+    <p:sldId id="281" r:id="rId23"/>
+    <p:sldId id="276" r:id="rId24"/>
+    <p:sldId id="282" r:id="rId25"/>
+    <p:sldId id="266" r:id="rId26"/>
+    <p:sldId id="267" r:id="rId27"/>
+    <p:sldId id="268" r:id="rId28"/>
+    <p:sldId id="269" r:id="rId29"/>
+    <p:sldId id="270" r:id="rId30"/>
   </p:sldIdLst>
   <p:sldSz cx="9144000" cy="6858000" type="screen4x3"/>
   <p:notesSz cx="7559675" cy="10691813"/>
@@ -6725,7 +6729,7 @@
         </p:blipFill>
         <p:spPr>
           <a:xfrm>
-            <a:off x="3709440" y="2496240"/>
+            <a:off x="3707904" y="2780928"/>
             <a:ext cx="5072400" cy="3394800"/>
           </a:xfrm>
           <a:prstGeom prst="rect">
@@ -6837,7 +6841,7 @@
               <a:buChar char=""/>
             </a:pPr>
             <a:r>
-              <a:rPr lang="de-DE" sz="2000" b="0" strike="noStrike" spc="-1" dirty="0">
+              <a:rPr lang="de-DE" sz="2000" b="0" strike="noStrike" spc="-1" dirty="0" smtClean="0">
                 <a:solidFill>
                   <a:srgbClr val="333333"/>
                 </a:solidFill>
@@ -6848,7 +6852,7 @@
                 </a:uFill>
                 <a:latin typeface="Arial"/>
               </a:rPr>
-              <a:t>A</a:t>
+              <a:t>Datenbankabfrage</a:t>
             </a:r>
             <a:endParaRPr lang="de-DE" sz="1800" b="0" strike="noStrike" spc="-1" dirty="0">
               <a:solidFill>
@@ -6874,7 +6878,7 @@
               <a:buChar char=""/>
             </a:pPr>
             <a:r>
-              <a:rPr lang="de-DE" sz="2000" b="0" strike="noStrike" spc="-1" dirty="0">
+              <a:rPr lang="de-DE" sz="2000" spc="-1" dirty="0" smtClean="0">
                 <a:solidFill>
                   <a:srgbClr val="333333"/>
                 </a:solidFill>
@@ -6885,7 +6889,7 @@
                 </a:uFill>
                 <a:latin typeface="Arial"/>
               </a:rPr>
-              <a:t>B</a:t>
+              <a:t>Darstellung vieler Graphen</a:t>
             </a:r>
             <a:endParaRPr lang="de-DE" sz="1800" b="0" strike="noStrike" spc="-1" dirty="0">
               <a:solidFill>
@@ -6911,7 +6915,7 @@
               <a:buChar char=""/>
             </a:pPr>
             <a:r>
-              <a:rPr lang="de-DE" sz="2000" b="0" strike="noStrike" spc="-1" dirty="0">
+              <a:rPr lang="de-DE" sz="2000" spc="-1" dirty="0" smtClean="0">
                 <a:solidFill>
                   <a:srgbClr val="333333"/>
                 </a:solidFill>
@@ -6922,7 +6926,7 @@
                 </a:uFill>
                 <a:latin typeface="Arial"/>
               </a:rPr>
-              <a:t>C</a:t>
+              <a:t>Analyse der Daten</a:t>
             </a:r>
             <a:endParaRPr lang="de-DE" sz="1800" b="0" strike="noStrike" spc="-1" dirty="0">
               <a:solidFill>
@@ -8918,7 +8922,7 @@
       </p:sp>
       <p:pic>
         <p:nvPicPr>
-          <p:cNvPr id="4" name="vid1.mp4">
+          <p:cNvPr id="5" name="v1.mp4">
             <a:hlinkClick r:id="" action="ppaction://media"/>
           </p:cNvPr>
           <p:cNvPicPr>
@@ -8937,7 +8941,7 @@
         <p:spPr>
           <a:xfrm>
             <a:off x="971600" y="908720"/>
-            <a:ext cx="7200800" cy="5400600"/>
+            <a:ext cx="7128792" cy="5346594"/>
           </a:xfrm>
           <a:prstGeom prst="rect">
             <a:avLst/>
@@ -8954,8 +8958,1826 @@
       <p:par>
         <p:cTn id="1" dur="indefinite" restart="never" nodeType="tmRoot">
           <p:childTnLst>
+            <p:seq concurrent="1" nextAc="seek">
+              <p:cTn id="2" dur="indefinite" nodeType="mainSeq">
+                <p:childTnLst>
+                  <p:par>
+                    <p:cTn id="3" fill="hold">
+                      <p:stCondLst>
+                        <p:cond delay="indefinite"/>
+                        <p:cond evt="onBegin" delay="0">
+                          <p:tn val="2"/>
+                        </p:cond>
+                      </p:stCondLst>
+                      <p:childTnLst>
+                        <p:par>
+                          <p:cTn id="4" fill="hold">
+                            <p:stCondLst>
+                              <p:cond delay="0"/>
+                            </p:stCondLst>
+                            <p:childTnLst>
+                              <p:par>
+                                <p:cTn id="5" presetID="1" presetClass="mediacall" presetSubtype="0" fill="hold" nodeType="afterEffect">
+                                  <p:stCondLst>
+                                    <p:cond delay="0"/>
+                                  </p:stCondLst>
+                                  <p:childTnLst>
+                                    <p:cmd type="call" cmd="playFrom(0.0)">
+                                      <p:cBhvr>
+                                        <p:cTn id="6" dur="1" fill="hold"/>
+                                        <p:tgtEl>
+                                          <p:spTgt spid="5"/>
+                                        </p:tgtEl>
+                                      </p:cBhvr>
+                                    </p:cmd>
+                                  </p:childTnLst>
+                                </p:cTn>
+                              </p:par>
+                            </p:childTnLst>
+                          </p:cTn>
+                        </p:par>
+                      </p:childTnLst>
+                    </p:cTn>
+                  </p:par>
+                </p:childTnLst>
+              </p:cTn>
+              <p:prevCondLst>
+                <p:cond evt="onPrev" delay="0">
+                  <p:tgtEl>
+                    <p:sldTgt/>
+                  </p:tgtEl>
+                </p:cond>
+              </p:prevCondLst>
+              <p:nextCondLst>
+                <p:cond evt="onNext" delay="0">
+                  <p:tgtEl>
+                    <p:sldTgt/>
+                  </p:tgtEl>
+                </p:cond>
+              </p:nextCondLst>
+            </p:seq>
+            <p:video>
+              <p:cMediaNode>
+                <p:cTn id="7" fill="hold" display="0">
+                  <p:stCondLst>
+                    <p:cond delay="indefinite"/>
+                  </p:stCondLst>
+                  <p:endCondLst>
+                    <p:cond evt="onNext" delay="0">
+                      <p:tgtEl>
+                        <p:sldTgt/>
+                      </p:tgtEl>
+                    </p:cond>
+                    <p:cond evt="onPrev" delay="0">
+                      <p:tgtEl>
+                        <p:sldTgt/>
+                      </p:tgtEl>
+                    </p:cond>
+                  </p:endCondLst>
+                </p:cTn>
+                <p:tgtEl>
+                  <p:spTgt spid="5"/>
+                </p:tgtEl>
+              </p:cMediaNode>
+            </p:video>
+            <p:seq concurrent="1" nextAc="seek">
+              <p:cTn id="8" restart="whenNotActive" fill="hold" evtFilter="cancelBubble" nodeType="interactiveSeq">
+                <p:stCondLst>
+                  <p:cond evt="onClick" delay="0">
+                    <p:tgtEl>
+                      <p:spTgt spid="5"/>
+                    </p:tgtEl>
+                  </p:cond>
+                </p:stCondLst>
+                <p:endSync evt="end" delay="0">
+                  <p:rtn val="all"/>
+                </p:endSync>
+                <p:childTnLst>
+                  <p:par>
+                    <p:cTn id="9" fill="hold">
+                      <p:stCondLst>
+                        <p:cond delay="0"/>
+                      </p:stCondLst>
+                      <p:childTnLst>
+                        <p:par>
+                          <p:cTn id="10" fill="hold">
+                            <p:stCondLst>
+                              <p:cond delay="0"/>
+                            </p:stCondLst>
+                            <p:childTnLst>
+                              <p:par>
+                                <p:cTn id="11" presetID="2" presetClass="mediacall" presetSubtype="0" fill="hold" nodeType="clickEffect">
+                                  <p:stCondLst>
+                                    <p:cond delay="0"/>
+                                  </p:stCondLst>
+                                  <p:childTnLst>
+                                    <p:cmd type="call" cmd="togglePause">
+                                      <p:cBhvr>
+                                        <p:cTn id="12" dur="1" fill="hold"/>
+                                        <p:tgtEl>
+                                          <p:spTgt spid="5"/>
+                                        </p:tgtEl>
+                                      </p:cBhvr>
+                                    </p:cmd>
+                                  </p:childTnLst>
+                                </p:cTn>
+                              </p:par>
+                            </p:childTnLst>
+                          </p:cTn>
+                        </p:par>
+                      </p:childTnLst>
+                    </p:cTn>
+                  </p:par>
+                </p:childTnLst>
+              </p:cTn>
+              <p:nextCondLst>
+                <p:cond evt="onClick" delay="0">
+                  <p:tgtEl>
+                    <p:spTgt spid="5"/>
+                  </p:tgtEl>
+                </p:cond>
+              </p:nextCondLst>
+            </p:seq>
+          </p:childTnLst>
+        </p:cTn>
+      </p:par>
+    </p:tnLst>
+  </p:timing>
+</p:sld>
+</file>
+
+<file path=ppt/slides/slide17.xml><?xml version="1.0" encoding="utf-8"?>
+<p:sld xmlns:a="http://schemas.openxmlformats.org/drawingml/2006/main" xmlns:r="http://schemas.openxmlformats.org/officeDocument/2006/relationships" xmlns:p="http://schemas.openxmlformats.org/presentationml/2006/main">
+  <p:cSld>
+    <p:spTree>
+      <p:nvGrpSpPr>
+        <p:cNvPr id="1" name=""/>
+        <p:cNvGrpSpPr/>
+        <p:nvPr/>
+      </p:nvGrpSpPr>
+      <p:grpSpPr>
+        <a:xfrm>
+          <a:off x="0" y="0"/>
+          <a:ext cx="0" cy="0"/>
+          <a:chOff x="0" y="0"/>
+          <a:chExt cx="0" cy="0"/>
+        </a:xfrm>
+      </p:grpSpPr>
+      <p:sp>
+        <p:nvSpPr>
+          <p:cNvPr id="174" name="CustomShape 1"/>
+          <p:cNvSpPr/>
+          <p:nvPr/>
+        </p:nvSpPr>
+        <p:spPr>
+          <a:xfrm>
+            <a:off x="719280" y="1288080"/>
+            <a:ext cx="7700400" cy="368640"/>
+          </a:xfrm>
+          <a:prstGeom prst="rect">
+            <a:avLst/>
+          </a:prstGeom>
+          <a:noFill/>
+          <a:ln>
+            <a:noFill/>
+          </a:ln>
+        </p:spPr>
+        <p:style>
+          <a:lnRef idx="0">
+            <a:scrgbClr r="0" g="0" b="0"/>
+          </a:lnRef>
+          <a:fillRef idx="0">
+            <a:scrgbClr r="0" g="0" b="0"/>
+          </a:fillRef>
+          <a:effectRef idx="0">
+            <a:scrgbClr r="0" g="0" b="0"/>
+          </a:effectRef>
+          <a:fontRef idx="minor"/>
+        </p:style>
+        <p:txBody>
+          <a:bodyPr lIns="0" tIns="0" rIns="0" bIns="0" anchor="b"/>
+          <a:lstStyle/>
+          <a:p>
+            <a:pPr>
+              <a:lnSpc>
+                <a:spcPct val="100000"/>
+              </a:lnSpc>
+            </a:pPr>
+            <a:r>
+              <a:rPr lang="de-DE" sz="2400" b="1" strike="noStrike" spc="-1">
+                <a:solidFill>
+                  <a:srgbClr val="2D2015"/>
+                </a:solidFill>
+                <a:uFill>
+                  <a:solidFill>
+                    <a:srgbClr val="FFFFFF"/>
+                  </a:solidFill>
+                </a:uFill>
+                <a:latin typeface="Arial"/>
+              </a:rPr>
+              <a:t>GUI</a:t>
+            </a:r>
+            <a:endParaRPr lang="de-DE" sz="1800" b="0" strike="noStrike" spc="-1">
+              <a:solidFill>
+                <a:srgbClr val="000000"/>
+              </a:solidFill>
+              <a:uFill>
+                <a:solidFill>
+                  <a:srgbClr val="FFFFFF"/>
+                </a:solidFill>
+              </a:uFill>
+              <a:latin typeface="Arial"/>
+            </a:endParaRPr>
+          </a:p>
+        </p:txBody>
+      </p:sp>
+      <p:sp>
+        <p:nvSpPr>
+          <p:cNvPr id="177" name="CustomShape 2"/>
+          <p:cNvSpPr/>
+          <p:nvPr/>
+        </p:nvSpPr>
+        <p:spPr>
+          <a:xfrm>
+            <a:off x="719280" y="1773360"/>
+            <a:ext cx="7705080" cy="4352040"/>
+          </a:xfrm>
+          <a:prstGeom prst="rect">
+            <a:avLst/>
+          </a:prstGeom>
+          <a:noFill/>
+          <a:ln>
+            <a:noFill/>
+          </a:ln>
+        </p:spPr>
+        <p:style>
+          <a:lnRef idx="0">
+            <a:scrgbClr r="0" g="0" b="0"/>
+          </a:lnRef>
+          <a:fillRef idx="0">
+            <a:scrgbClr r="0" g="0" b="0"/>
+          </a:fillRef>
+          <a:effectRef idx="0">
+            <a:scrgbClr r="0" g="0" b="0"/>
+          </a:effectRef>
+          <a:fontRef idx="minor"/>
+        </p:style>
+        <p:txBody>
+          <a:bodyPr lIns="0" tIns="0" rIns="0" bIns="0"/>
+          <a:lstStyle/>
+          <a:p>
+            <a:pPr>
+              <a:lnSpc>
+                <a:spcPct val="100000"/>
+              </a:lnSpc>
+            </a:pPr>
+            <a:r>
+              <a:rPr lang="de-DE" sz="2000" b="0" strike="noStrike" spc="-1" dirty="0" smtClean="0">
+                <a:solidFill>
+                  <a:srgbClr val="333333"/>
+                </a:solidFill>
+                <a:uFill>
+                  <a:solidFill>
+                    <a:srgbClr val="FFFFFF"/>
+                  </a:solidFill>
+                </a:uFill>
+                <a:latin typeface="Arial"/>
+              </a:rPr>
+              <a:t>Aufgaben:</a:t>
+            </a:r>
+            <a:endParaRPr lang="de-DE" sz="1800" b="0" strike="noStrike" spc="-1" dirty="0">
+              <a:solidFill>
+                <a:srgbClr val="000000"/>
+              </a:solidFill>
+              <a:uFill>
+                <a:solidFill>
+                  <a:srgbClr val="FFFFFF"/>
+                </a:solidFill>
+              </a:uFill>
+              <a:latin typeface="Arial"/>
+            </a:endParaRPr>
+          </a:p>
+          <a:p>
+            <a:pPr marL="181080" indent="-180360">
+              <a:lnSpc>
+                <a:spcPct val="100000"/>
+              </a:lnSpc>
+              <a:buClr>
+                <a:srgbClr val="333333"/>
+              </a:buClr>
+            </a:pPr>
+            <a:r>
+              <a:rPr lang="de-DE" sz="2000" spc="-1" dirty="0" smtClean="0">
+                <a:solidFill>
+                  <a:srgbClr val="333333"/>
+                </a:solidFill>
+                <a:uFill>
+                  <a:solidFill>
+                    <a:srgbClr val="FFFFFF"/>
+                  </a:solidFill>
+                </a:uFill>
+                <a:latin typeface="Arial"/>
+              </a:rPr>
+              <a:t>3. Datenbankabfrage und </a:t>
+            </a:r>
+            <a:r>
+              <a:rPr lang="de-DE" sz="2000" spc="-1" dirty="0" smtClean="0">
+                <a:solidFill>
+                  <a:srgbClr val="333333"/>
+                </a:solidFill>
+                <a:uFill>
+                  <a:solidFill>
+                    <a:srgbClr val="FFFFFF"/>
+                  </a:solidFill>
+                </a:uFill>
+                <a:latin typeface="Arial"/>
+              </a:rPr>
+              <a:t>Live-Darstellung</a:t>
+            </a:r>
+          </a:p>
+          <a:p>
+            <a:pPr marL="181080" indent="-180360">
+              <a:lnSpc>
+                <a:spcPct val="100000"/>
+              </a:lnSpc>
+              <a:buClr>
+                <a:srgbClr val="333333"/>
+              </a:buClr>
+            </a:pPr>
+            <a:endParaRPr lang="de-DE" sz="2000" spc="-1" dirty="0" smtClean="0">
+              <a:solidFill>
+                <a:srgbClr val="333333"/>
+              </a:solidFill>
+              <a:uFill>
+                <a:solidFill>
+                  <a:srgbClr val="FFFFFF"/>
+                </a:solidFill>
+              </a:uFill>
+              <a:latin typeface="Arial"/>
+            </a:endParaRPr>
+          </a:p>
+          <a:p>
+            <a:pPr marL="181080" indent="-180360">
+              <a:lnSpc>
+                <a:spcPct val="100000"/>
+              </a:lnSpc>
+              <a:buClr>
+                <a:srgbClr val="333333"/>
+              </a:buClr>
+            </a:pPr>
+            <a:r>
+              <a:rPr lang="de-DE" sz="2000" spc="-1" dirty="0" smtClean="0">
+                <a:solidFill>
+                  <a:srgbClr val="333333"/>
+                </a:solidFill>
+                <a:uFill>
+                  <a:solidFill>
+                    <a:srgbClr val="FFFFFF"/>
+                  </a:solidFill>
+                </a:uFill>
+                <a:latin typeface="Arial"/>
+              </a:rPr>
+              <a:t>Probleme</a:t>
+            </a:r>
+          </a:p>
+          <a:p>
+            <a:pPr marL="181080" indent="-180360">
+              <a:lnSpc>
+                <a:spcPct val="100000"/>
+              </a:lnSpc>
+              <a:buClr>
+                <a:srgbClr val="333333"/>
+              </a:buClr>
+              <a:buFont typeface="Arial" pitchFamily="34" charset="0"/>
+              <a:buChar char="•"/>
+            </a:pPr>
+            <a:r>
+              <a:rPr lang="de-DE" sz="2000" spc="-1" dirty="0" smtClean="0">
+                <a:solidFill>
+                  <a:srgbClr val="333333"/>
+                </a:solidFill>
+                <a:uFill>
+                  <a:solidFill>
+                    <a:srgbClr val="FFFFFF"/>
+                  </a:solidFill>
+                </a:uFill>
+                <a:latin typeface="Arial"/>
+              </a:rPr>
+              <a:t>20ms Verzögerung zwischen jedem Datensatz</a:t>
+            </a:r>
+          </a:p>
+          <a:p>
+            <a:pPr marL="638280" lvl="1" indent="-180360">
+              <a:buClr>
+                <a:srgbClr val="333333"/>
+              </a:buClr>
+              <a:buFont typeface="Arial" pitchFamily="34" charset="0"/>
+              <a:buChar char="•"/>
+            </a:pPr>
+            <a:r>
+              <a:rPr lang="de-DE" sz="2000" spc="-1" dirty="0" smtClean="0">
+                <a:solidFill>
+                  <a:srgbClr val="333333"/>
+                </a:solidFill>
+                <a:uFill>
+                  <a:solidFill>
+                    <a:srgbClr val="FFFFFF"/>
+                  </a:solidFill>
+                </a:uFill>
+                <a:latin typeface="Arial"/>
+              </a:rPr>
+              <a:t>Tatsächliche Verzögerung schwankt, ca. 100ms</a:t>
+            </a:r>
+            <a:endParaRPr lang="de-DE" sz="2000" spc="-1" dirty="0" smtClean="0">
+              <a:solidFill>
+                <a:srgbClr val="333333"/>
+              </a:solidFill>
+              <a:uFill>
+                <a:solidFill>
+                  <a:srgbClr val="FFFFFF"/>
+                </a:solidFill>
+              </a:uFill>
+              <a:latin typeface="Arial"/>
+            </a:endParaRPr>
+          </a:p>
+          <a:p>
+            <a:pPr marL="181080" indent="-180360">
+              <a:lnSpc>
+                <a:spcPct val="100000"/>
+              </a:lnSpc>
+              <a:buClr>
+                <a:srgbClr val="333333"/>
+              </a:buClr>
+              <a:buFont typeface="Arial" pitchFamily="34" charset="0"/>
+              <a:buChar char="•"/>
+            </a:pPr>
+            <a:r>
+              <a:rPr lang="de-DE" sz="2000" spc="-1" dirty="0" smtClean="0">
+                <a:solidFill>
+                  <a:srgbClr val="333333"/>
+                </a:solidFill>
+                <a:uFill>
+                  <a:solidFill>
+                    <a:srgbClr val="FFFFFF"/>
+                  </a:solidFill>
+                </a:uFill>
+                <a:latin typeface="Arial"/>
+              </a:rPr>
+              <a:t>Datenabfrage an SQL </a:t>
+            </a:r>
+            <a:r>
+              <a:rPr lang="de-DE" sz="2000" spc="-1" dirty="0" err="1" smtClean="0">
+                <a:solidFill>
+                  <a:srgbClr val="333333"/>
+                </a:solidFill>
+                <a:uFill>
+                  <a:solidFill>
+                    <a:srgbClr val="FFFFFF"/>
+                  </a:solidFill>
+                </a:uFill>
+                <a:latin typeface="Arial"/>
+              </a:rPr>
+              <a:t>limit</a:t>
+            </a:r>
+            <a:r>
+              <a:rPr lang="de-DE" sz="2000" spc="-1" dirty="0" smtClean="0">
+                <a:solidFill>
+                  <a:srgbClr val="333333"/>
+                </a:solidFill>
+                <a:uFill>
+                  <a:solidFill>
+                    <a:srgbClr val="FFFFFF"/>
+                  </a:solidFill>
+                </a:uFill>
+                <a:latin typeface="Arial"/>
+              </a:rPr>
+              <a:t> geknüpft</a:t>
+            </a:r>
+          </a:p>
+          <a:p>
+            <a:pPr marL="638280" lvl="1" indent="-180360">
+              <a:buClr>
+                <a:srgbClr val="333333"/>
+              </a:buClr>
+              <a:buFont typeface="Arial" pitchFamily="34" charset="0"/>
+              <a:buChar char="•"/>
+            </a:pPr>
+            <a:r>
+              <a:rPr lang="de-DE" sz="2000" spc="-1" dirty="0" smtClean="0">
+                <a:solidFill>
+                  <a:srgbClr val="333333"/>
+                </a:solidFill>
+                <a:uFill>
+                  <a:solidFill>
+                    <a:srgbClr val="FFFFFF"/>
+                  </a:solidFill>
+                </a:uFill>
+                <a:latin typeface="Arial"/>
+              </a:rPr>
+              <a:t>SELECT * FROM </a:t>
+            </a:r>
+            <a:r>
+              <a:rPr lang="de-DE" sz="2000" spc="-1" dirty="0" err="1" smtClean="0">
+                <a:solidFill>
+                  <a:srgbClr val="333333"/>
+                </a:solidFill>
+                <a:uFill>
+                  <a:solidFill>
+                    <a:srgbClr val="FFFFFF"/>
+                  </a:solidFill>
+                </a:uFill>
+                <a:latin typeface="Arial"/>
+              </a:rPr>
+              <a:t>table</a:t>
+            </a:r>
+            <a:r>
+              <a:rPr lang="de-DE" sz="2000" spc="-1" dirty="0" smtClean="0">
+                <a:solidFill>
+                  <a:srgbClr val="333333"/>
+                </a:solidFill>
+                <a:uFill>
+                  <a:solidFill>
+                    <a:srgbClr val="FFFFFF"/>
+                  </a:solidFill>
+                </a:uFill>
+                <a:latin typeface="Arial"/>
+              </a:rPr>
+              <a:t> … </a:t>
+            </a:r>
+            <a:r>
+              <a:rPr lang="de-DE" sz="2000" spc="-1" dirty="0" err="1" smtClean="0">
+                <a:solidFill>
+                  <a:srgbClr val="333333"/>
+                </a:solidFill>
+                <a:uFill>
+                  <a:solidFill>
+                    <a:srgbClr val="FFFFFF"/>
+                  </a:solidFill>
+                </a:uFill>
+                <a:latin typeface="Arial"/>
+              </a:rPr>
+              <a:t>limit</a:t>
+            </a:r>
+            <a:r>
+              <a:rPr lang="de-DE" sz="2000" spc="-1" dirty="0" smtClean="0">
+                <a:solidFill>
+                  <a:srgbClr val="333333"/>
+                </a:solidFill>
+                <a:uFill>
+                  <a:solidFill>
+                    <a:srgbClr val="FFFFFF"/>
+                  </a:solidFill>
+                </a:uFill>
+                <a:latin typeface="Arial"/>
+              </a:rPr>
+              <a:t> 150</a:t>
+            </a:r>
+          </a:p>
+          <a:p>
+            <a:pPr marL="638280" lvl="1" indent="-180360">
+              <a:buClr>
+                <a:srgbClr val="333333"/>
+              </a:buClr>
+              <a:buFont typeface="Arial" pitchFamily="34" charset="0"/>
+              <a:buChar char="•"/>
+            </a:pPr>
+            <a:r>
+              <a:rPr lang="de-DE" sz="2000" spc="-1" dirty="0" smtClean="0">
+                <a:solidFill>
+                  <a:srgbClr val="333333"/>
+                </a:solidFill>
+                <a:uFill>
+                  <a:solidFill>
+                    <a:srgbClr val="FFFFFF"/>
+                  </a:solidFill>
+                </a:uFill>
+                <a:latin typeface="Arial"/>
+              </a:rPr>
+              <a:t>Abfrage bei </a:t>
+            </a:r>
+            <a:r>
+              <a:rPr lang="de-DE" sz="2000" spc="-1" dirty="0" err="1" smtClean="0">
+                <a:solidFill>
+                  <a:srgbClr val="333333"/>
+                </a:solidFill>
+                <a:uFill>
+                  <a:solidFill>
+                    <a:srgbClr val="FFFFFF"/>
+                  </a:solidFill>
+                </a:uFill>
+                <a:latin typeface="Arial"/>
+              </a:rPr>
+              <a:t>limit</a:t>
+            </a:r>
+            <a:r>
+              <a:rPr lang="de-DE" sz="2000" spc="-1" dirty="0" smtClean="0">
+                <a:solidFill>
+                  <a:srgbClr val="333333"/>
+                </a:solidFill>
+                <a:uFill>
+                  <a:solidFill>
+                    <a:srgbClr val="FFFFFF"/>
+                  </a:solidFill>
+                </a:uFill>
+                <a:latin typeface="Arial"/>
+              </a:rPr>
+              <a:t>/2</a:t>
+            </a:r>
+          </a:p>
+          <a:p>
+            <a:pPr marL="638280" lvl="1" indent="-180360">
+              <a:buClr>
+                <a:srgbClr val="333333"/>
+              </a:buClr>
+              <a:buFont typeface="Arial" pitchFamily="34" charset="0"/>
+              <a:buChar char="•"/>
+            </a:pPr>
+            <a:r>
+              <a:rPr lang="de-DE" sz="2000" spc="-1" dirty="0" smtClean="0">
+                <a:solidFill>
+                  <a:srgbClr val="333333"/>
+                </a:solidFill>
+                <a:uFill>
+                  <a:solidFill>
+                    <a:srgbClr val="FFFFFF"/>
+                  </a:solidFill>
+                </a:uFill>
+                <a:latin typeface="Arial"/>
+              </a:rPr>
+              <a:t>Abfrage nur ca. alle 10s</a:t>
+            </a:r>
+            <a:endParaRPr lang="de-DE" sz="2000" spc="-1" dirty="0" smtClean="0">
+              <a:solidFill>
+                <a:srgbClr val="333333"/>
+              </a:solidFill>
+              <a:uFill>
+                <a:solidFill>
+                  <a:srgbClr val="FFFFFF"/>
+                </a:solidFill>
+              </a:uFill>
+              <a:latin typeface="Arial"/>
+            </a:endParaRPr>
+          </a:p>
+        </p:txBody>
+      </p:sp>
+    </p:spTree>
+  </p:cSld>
+  <p:clrMapOvr>
+    <a:masterClrMapping/>
+  </p:clrMapOvr>
+  <p:timing>
+    <p:tnLst>
+      <p:par>
+        <p:cTn id="1" dur="indefinite" restart="never" nodeType="tmRoot">
+          <p:childTnLst>
             <p:seq>
-              <p:cTn id="2" nodeType="mainSeq">
+              <p:cTn id="2" nodeType="mainSeq"/>
+              <p:prevCondLst>
+                <p:cond evt="onPrev" delay="0">
+                  <p:tgtEl>
+                    <p:sldTgt/>
+                  </p:tgtEl>
+                </p:cond>
+              </p:prevCondLst>
+              <p:nextCondLst>
+                <p:cond evt="onNext" delay="0">
+                  <p:tgtEl>
+                    <p:sldTgt/>
+                  </p:tgtEl>
+                </p:cond>
+              </p:nextCondLst>
+            </p:seq>
+          </p:childTnLst>
+        </p:cTn>
+      </p:par>
+    </p:tnLst>
+  </p:timing>
+</p:sld>
+</file>
+
+<file path=ppt/slides/slide18.xml><?xml version="1.0" encoding="utf-8"?>
+<p:sld xmlns:a="http://schemas.openxmlformats.org/drawingml/2006/main" xmlns:r="http://schemas.openxmlformats.org/officeDocument/2006/relationships" xmlns:p="http://schemas.openxmlformats.org/presentationml/2006/main">
+  <p:cSld>
+    <p:spTree>
+      <p:nvGrpSpPr>
+        <p:cNvPr id="1" name=""/>
+        <p:cNvGrpSpPr/>
+        <p:nvPr/>
+      </p:nvGrpSpPr>
+      <p:grpSpPr>
+        <a:xfrm>
+          <a:off x="0" y="0"/>
+          <a:ext cx="0" cy="0"/>
+          <a:chOff x="0" y="0"/>
+          <a:chExt cx="0" cy="0"/>
+        </a:xfrm>
+      </p:grpSpPr>
+      <p:sp>
+        <p:nvSpPr>
+          <p:cNvPr id="174" name="CustomShape 1"/>
+          <p:cNvSpPr/>
+          <p:nvPr/>
+        </p:nvSpPr>
+        <p:spPr>
+          <a:xfrm>
+            <a:off x="719280" y="1288080"/>
+            <a:ext cx="7700400" cy="368640"/>
+          </a:xfrm>
+          <a:prstGeom prst="rect">
+            <a:avLst/>
+          </a:prstGeom>
+          <a:noFill/>
+          <a:ln>
+            <a:noFill/>
+          </a:ln>
+        </p:spPr>
+        <p:style>
+          <a:lnRef idx="0">
+            <a:scrgbClr r="0" g="0" b="0"/>
+          </a:lnRef>
+          <a:fillRef idx="0">
+            <a:scrgbClr r="0" g="0" b="0"/>
+          </a:fillRef>
+          <a:effectRef idx="0">
+            <a:scrgbClr r="0" g="0" b="0"/>
+          </a:effectRef>
+          <a:fontRef idx="minor"/>
+        </p:style>
+        <p:txBody>
+          <a:bodyPr lIns="0" tIns="0" rIns="0" bIns="0" anchor="b"/>
+          <a:lstStyle/>
+          <a:p>
+            <a:pPr>
+              <a:lnSpc>
+                <a:spcPct val="100000"/>
+              </a:lnSpc>
+            </a:pPr>
+            <a:r>
+              <a:rPr lang="de-DE" sz="2400" b="1" strike="noStrike" spc="-1">
+                <a:solidFill>
+                  <a:srgbClr val="2D2015"/>
+                </a:solidFill>
+                <a:uFill>
+                  <a:solidFill>
+                    <a:srgbClr val="FFFFFF"/>
+                  </a:solidFill>
+                </a:uFill>
+                <a:latin typeface="Arial"/>
+              </a:rPr>
+              <a:t>GUI</a:t>
+            </a:r>
+            <a:endParaRPr lang="de-DE" sz="1800" b="0" strike="noStrike" spc="-1">
+              <a:solidFill>
+                <a:srgbClr val="000000"/>
+              </a:solidFill>
+              <a:uFill>
+                <a:solidFill>
+                  <a:srgbClr val="FFFFFF"/>
+                </a:solidFill>
+              </a:uFill>
+              <a:latin typeface="Arial"/>
+            </a:endParaRPr>
+          </a:p>
+        </p:txBody>
+      </p:sp>
+      <p:sp>
+        <p:nvSpPr>
+          <p:cNvPr id="177" name="CustomShape 2"/>
+          <p:cNvSpPr/>
+          <p:nvPr/>
+        </p:nvSpPr>
+        <p:spPr>
+          <a:xfrm>
+            <a:off x="719280" y="1773360"/>
+            <a:ext cx="7705080" cy="4352040"/>
+          </a:xfrm>
+          <a:prstGeom prst="rect">
+            <a:avLst/>
+          </a:prstGeom>
+          <a:noFill/>
+          <a:ln>
+            <a:noFill/>
+          </a:ln>
+        </p:spPr>
+        <p:style>
+          <a:lnRef idx="0">
+            <a:scrgbClr r="0" g="0" b="0"/>
+          </a:lnRef>
+          <a:fillRef idx="0">
+            <a:scrgbClr r="0" g="0" b="0"/>
+          </a:fillRef>
+          <a:effectRef idx="0">
+            <a:scrgbClr r="0" g="0" b="0"/>
+          </a:effectRef>
+          <a:fontRef idx="minor"/>
+        </p:style>
+        <p:txBody>
+          <a:bodyPr lIns="0" tIns="0" rIns="0" bIns="0"/>
+          <a:lstStyle/>
+          <a:p>
+            <a:pPr>
+              <a:lnSpc>
+                <a:spcPct val="100000"/>
+              </a:lnSpc>
+            </a:pPr>
+            <a:r>
+              <a:rPr lang="de-DE" sz="2000" b="0" strike="noStrike" spc="-1" dirty="0" smtClean="0">
+                <a:solidFill>
+                  <a:srgbClr val="333333"/>
+                </a:solidFill>
+                <a:uFill>
+                  <a:solidFill>
+                    <a:srgbClr val="FFFFFF"/>
+                  </a:solidFill>
+                </a:uFill>
+                <a:latin typeface="Arial"/>
+              </a:rPr>
+              <a:t>Aufgaben:</a:t>
+            </a:r>
+            <a:endParaRPr lang="de-DE" sz="1800" b="0" strike="noStrike" spc="-1" dirty="0">
+              <a:solidFill>
+                <a:srgbClr val="000000"/>
+              </a:solidFill>
+              <a:uFill>
+                <a:solidFill>
+                  <a:srgbClr val="FFFFFF"/>
+                </a:solidFill>
+              </a:uFill>
+              <a:latin typeface="Arial"/>
+            </a:endParaRPr>
+          </a:p>
+          <a:p>
+            <a:pPr marL="181080" indent="-180360">
+              <a:lnSpc>
+                <a:spcPct val="100000"/>
+              </a:lnSpc>
+              <a:buClr>
+                <a:srgbClr val="333333"/>
+              </a:buClr>
+            </a:pPr>
+            <a:r>
+              <a:rPr lang="de-DE" sz="2000" spc="-1" dirty="0" smtClean="0">
+                <a:solidFill>
+                  <a:srgbClr val="333333"/>
+                </a:solidFill>
+                <a:uFill>
+                  <a:solidFill>
+                    <a:srgbClr val="FFFFFF"/>
+                  </a:solidFill>
+                </a:uFill>
+                <a:latin typeface="Arial"/>
+              </a:rPr>
+              <a:t>3. Datenbankabfrage und </a:t>
+            </a:r>
+            <a:r>
+              <a:rPr lang="de-DE" sz="2000" spc="-1" dirty="0" smtClean="0">
+                <a:solidFill>
+                  <a:srgbClr val="333333"/>
+                </a:solidFill>
+                <a:uFill>
+                  <a:solidFill>
+                    <a:srgbClr val="FFFFFF"/>
+                  </a:solidFill>
+                </a:uFill>
+                <a:latin typeface="Arial"/>
+              </a:rPr>
+              <a:t>Live-Darstellung</a:t>
+            </a:r>
+          </a:p>
+          <a:p>
+            <a:pPr marL="181080" indent="-180360">
+              <a:lnSpc>
+                <a:spcPct val="100000"/>
+              </a:lnSpc>
+              <a:buClr>
+                <a:srgbClr val="333333"/>
+              </a:buClr>
+            </a:pPr>
+            <a:endParaRPr lang="de-DE" sz="2000" spc="-1" dirty="0" smtClean="0">
+              <a:solidFill>
+                <a:srgbClr val="333333"/>
+              </a:solidFill>
+              <a:uFill>
+                <a:solidFill>
+                  <a:srgbClr val="FFFFFF"/>
+                </a:solidFill>
+              </a:uFill>
+              <a:latin typeface="Arial"/>
+            </a:endParaRPr>
+          </a:p>
+          <a:p>
+            <a:pPr marL="181080" indent="-180360">
+              <a:lnSpc>
+                <a:spcPct val="100000"/>
+              </a:lnSpc>
+              <a:buClr>
+                <a:srgbClr val="333333"/>
+              </a:buClr>
+            </a:pPr>
+            <a:r>
+              <a:rPr lang="de-DE" sz="2000" spc="-1" dirty="0" smtClean="0">
+                <a:solidFill>
+                  <a:srgbClr val="333333"/>
+                </a:solidFill>
+                <a:uFill>
+                  <a:solidFill>
+                    <a:srgbClr val="FFFFFF"/>
+                  </a:solidFill>
+                </a:uFill>
+                <a:latin typeface="Arial"/>
+              </a:rPr>
+              <a:t>Lösung</a:t>
+            </a:r>
+          </a:p>
+          <a:p>
+            <a:pPr marL="181080" indent="-180360">
+              <a:lnSpc>
+                <a:spcPct val="100000"/>
+              </a:lnSpc>
+              <a:buClr>
+                <a:srgbClr val="333333"/>
+              </a:buClr>
+              <a:buFont typeface="Arial" pitchFamily="34" charset="0"/>
+              <a:buChar char="•"/>
+            </a:pPr>
+            <a:r>
+              <a:rPr lang="de-DE" sz="2000" spc="-1" dirty="0" smtClean="0">
+                <a:solidFill>
+                  <a:srgbClr val="333333"/>
+                </a:solidFill>
+                <a:uFill>
+                  <a:solidFill>
+                    <a:srgbClr val="FFFFFF"/>
+                  </a:solidFill>
+                </a:uFill>
+                <a:latin typeface="Arial"/>
+              </a:rPr>
+              <a:t>Verzögerung abhängig von PITIME</a:t>
+            </a:r>
+          </a:p>
+          <a:p>
+            <a:pPr marL="638280" lvl="2" indent="-180360">
+              <a:buClr>
+                <a:srgbClr val="333333"/>
+              </a:buClr>
+              <a:buFont typeface="Arial" pitchFamily="34" charset="0"/>
+              <a:buChar char="•"/>
+            </a:pPr>
+            <a:r>
+              <a:rPr lang="de-DE" sz="2000" spc="-1" dirty="0" smtClean="0">
+                <a:solidFill>
+                  <a:srgbClr val="333333"/>
+                </a:solidFill>
+                <a:uFill>
+                  <a:solidFill>
+                    <a:srgbClr val="FFFFFF"/>
+                  </a:solidFill>
+                </a:uFill>
+              </a:rPr>
+              <a:t>Jeweils 2 </a:t>
+            </a:r>
+            <a:r>
+              <a:rPr lang="de-DE" sz="2000" spc="-1" dirty="0" err="1" smtClean="0">
+                <a:solidFill>
+                  <a:srgbClr val="333333"/>
+                </a:solidFill>
+                <a:uFill>
+                  <a:solidFill>
+                    <a:srgbClr val="FFFFFF"/>
+                  </a:solidFill>
+                </a:uFill>
+              </a:rPr>
+              <a:t>Timestamps</a:t>
+            </a:r>
+            <a:r>
+              <a:rPr lang="de-DE" sz="2000" spc="-1" dirty="0" smtClean="0">
+                <a:solidFill>
+                  <a:srgbClr val="333333"/>
+                </a:solidFill>
+                <a:uFill>
+                  <a:solidFill>
+                    <a:srgbClr val="FFFFFF"/>
+                  </a:solidFill>
+                </a:uFill>
+              </a:rPr>
+              <a:t> speichern und Differenz </a:t>
+            </a:r>
+            <a:r>
+              <a:rPr lang="de-DE" sz="2000" spc="-1" dirty="0" smtClean="0">
+                <a:solidFill>
+                  <a:srgbClr val="333333"/>
+                </a:solidFill>
+                <a:uFill>
+                  <a:solidFill>
+                    <a:srgbClr val="FFFFFF"/>
+                  </a:solidFill>
+                </a:uFill>
+              </a:rPr>
+              <a:t>berechnen</a:t>
+            </a:r>
+            <a:endParaRPr lang="de-DE" sz="2000" spc="-1" dirty="0" smtClean="0">
+              <a:solidFill>
+                <a:srgbClr val="333333"/>
+              </a:solidFill>
+              <a:uFill>
+                <a:solidFill>
+                  <a:srgbClr val="FFFFFF"/>
+                </a:solidFill>
+              </a:uFill>
+              <a:latin typeface="Arial"/>
+            </a:endParaRPr>
+          </a:p>
+          <a:p>
+            <a:pPr marL="181080" indent="-180360">
+              <a:lnSpc>
+                <a:spcPct val="100000"/>
+              </a:lnSpc>
+              <a:buClr>
+                <a:srgbClr val="333333"/>
+              </a:buClr>
+              <a:buFont typeface="Arial" pitchFamily="34" charset="0"/>
+              <a:buChar char="•"/>
+            </a:pPr>
+            <a:r>
+              <a:rPr lang="de-DE" sz="2000" spc="-1" dirty="0" smtClean="0">
+                <a:solidFill>
+                  <a:srgbClr val="333333"/>
+                </a:solidFill>
+                <a:uFill>
+                  <a:solidFill>
+                    <a:srgbClr val="FFFFFF"/>
+                  </a:solidFill>
+                </a:uFill>
+                <a:latin typeface="Arial"/>
+              </a:rPr>
+              <a:t>Abfrage an Größe der DB-Rückgabe knüpfen</a:t>
+            </a:r>
+          </a:p>
+          <a:p>
+            <a:pPr marL="638280" lvl="1" indent="-180360">
+              <a:buClr>
+                <a:srgbClr val="333333"/>
+              </a:buClr>
+              <a:buFont typeface="Arial" pitchFamily="34" charset="0"/>
+              <a:buChar char="•"/>
+            </a:pPr>
+            <a:r>
+              <a:rPr lang="de-DE" sz="2000" spc="-1" dirty="0" smtClean="0">
+                <a:solidFill>
+                  <a:srgbClr val="333333"/>
+                </a:solidFill>
+                <a:uFill>
+                  <a:solidFill>
+                    <a:srgbClr val="FFFFFF"/>
+                  </a:solidFill>
+                </a:uFill>
+                <a:latin typeface="Arial"/>
+              </a:rPr>
+              <a:t>DB gibt Liste der Größe 20 zurück</a:t>
+            </a:r>
+          </a:p>
+          <a:p>
+            <a:pPr marL="638280" lvl="1" indent="-180360">
+              <a:buClr>
+                <a:srgbClr val="333333"/>
+              </a:buClr>
+              <a:buFont typeface="Arial" pitchFamily="34" charset="0"/>
+              <a:buChar char="•"/>
+            </a:pPr>
+            <a:r>
+              <a:rPr lang="de-DE" sz="2000" spc="-1" dirty="0" smtClean="0">
+                <a:solidFill>
+                  <a:srgbClr val="333333"/>
+                </a:solidFill>
+                <a:uFill>
+                  <a:solidFill>
+                    <a:srgbClr val="FFFFFF"/>
+                  </a:solidFill>
+                </a:uFill>
+                <a:latin typeface="Arial"/>
+              </a:rPr>
+              <a:t>Bei 10 angezeigten Daten, neue Abfrage starten</a:t>
+            </a:r>
+          </a:p>
+        </p:txBody>
+      </p:sp>
+    </p:spTree>
+  </p:cSld>
+  <p:clrMapOvr>
+    <a:masterClrMapping/>
+  </p:clrMapOvr>
+  <p:timing>
+    <p:tnLst>
+      <p:par>
+        <p:cTn id="1" dur="indefinite" restart="never" nodeType="tmRoot">
+          <p:childTnLst>
+            <p:seq>
+              <p:cTn id="2" nodeType="mainSeq"/>
+              <p:prevCondLst>
+                <p:cond evt="onPrev" delay="0">
+                  <p:tgtEl>
+                    <p:sldTgt/>
+                  </p:tgtEl>
+                </p:cond>
+              </p:prevCondLst>
+              <p:nextCondLst>
+                <p:cond evt="onNext" delay="0">
+                  <p:tgtEl>
+                    <p:sldTgt/>
+                  </p:tgtEl>
+                </p:cond>
+              </p:nextCondLst>
+            </p:seq>
+          </p:childTnLst>
+        </p:cTn>
+      </p:par>
+    </p:tnLst>
+  </p:timing>
+</p:sld>
+</file>
+
+<file path=ppt/slides/slide19.xml><?xml version="1.0" encoding="utf-8"?>
+<p:sld xmlns:a="http://schemas.openxmlformats.org/drawingml/2006/main" xmlns:r="http://schemas.openxmlformats.org/officeDocument/2006/relationships" xmlns:p="http://schemas.openxmlformats.org/presentationml/2006/main">
+  <p:cSld>
+    <p:spTree>
+      <p:nvGrpSpPr>
+        <p:cNvPr id="1" name=""/>
+        <p:cNvGrpSpPr/>
+        <p:nvPr/>
+      </p:nvGrpSpPr>
+      <p:grpSpPr>
+        <a:xfrm>
+          <a:off x="0" y="0"/>
+          <a:ext cx="0" cy="0"/>
+          <a:chOff x="0" y="0"/>
+          <a:chExt cx="0" cy="0"/>
+        </a:xfrm>
+      </p:grpSpPr>
+      <p:pic>
+        <p:nvPicPr>
+          <p:cNvPr id="10" name="v2.mp4">
+            <a:hlinkClick r:id="" action="ppaction://media"/>
+          </p:cNvPr>
+          <p:cNvPicPr>
+            <a:picLocks noRot="1" noChangeAspect="1"/>
+          </p:cNvPicPr>
+          <p:nvPr>
+            <a:videoFile r:link="rId1"/>
+          </p:nvPr>
+        </p:nvPicPr>
+        <p:blipFill>
+          <a:blip r:embed="rId3" cstate="print"/>
+          <a:stretch>
+            <a:fillRect/>
+          </a:stretch>
+        </p:blipFill>
+        <p:spPr>
+          <a:xfrm>
+            <a:off x="1043608" y="908720"/>
+            <a:ext cx="7128792" cy="5346594"/>
+          </a:xfrm>
+          <a:prstGeom prst="rect">
+            <a:avLst/>
+          </a:prstGeom>
+        </p:spPr>
+      </p:pic>
+    </p:spTree>
+  </p:cSld>
+  <p:clrMapOvr>
+    <a:masterClrMapping/>
+  </p:clrMapOvr>
+  <p:timing>
+    <p:tnLst>
+      <p:par>
+        <p:cTn id="1" dur="indefinite" restart="never" nodeType="tmRoot">
+          <p:childTnLst>
+            <p:seq concurrent="1" nextAc="seek">
+              <p:cTn id="2" dur="indefinite" nodeType="mainSeq">
+                <p:childTnLst>
+                  <p:par>
+                    <p:cTn id="3" fill="hold">
+                      <p:stCondLst>
+                        <p:cond delay="indefinite"/>
+                        <p:cond evt="onBegin" delay="0">
+                          <p:tn val="2"/>
+                        </p:cond>
+                      </p:stCondLst>
+                      <p:childTnLst>
+                        <p:par>
+                          <p:cTn id="4" fill="hold">
+                            <p:stCondLst>
+                              <p:cond delay="0"/>
+                            </p:stCondLst>
+                            <p:childTnLst>
+                              <p:par>
+                                <p:cTn id="5" presetID="1" presetClass="mediacall" presetSubtype="0" fill="hold" nodeType="afterEffect">
+                                  <p:stCondLst>
+                                    <p:cond delay="0"/>
+                                  </p:stCondLst>
+                                  <p:childTnLst>
+                                    <p:cmd type="call" cmd="playFrom(0.0)">
+                                      <p:cBhvr>
+                                        <p:cTn id="6" dur="1" fill="hold"/>
+                                        <p:tgtEl>
+                                          <p:spTgt spid="10"/>
+                                        </p:tgtEl>
+                                      </p:cBhvr>
+                                    </p:cmd>
+                                  </p:childTnLst>
+                                </p:cTn>
+                              </p:par>
+                            </p:childTnLst>
+                          </p:cTn>
+                        </p:par>
+                      </p:childTnLst>
+                    </p:cTn>
+                  </p:par>
+                </p:childTnLst>
+              </p:cTn>
+              <p:prevCondLst>
+                <p:cond evt="onPrev" delay="0">
+                  <p:tgtEl>
+                    <p:sldTgt/>
+                  </p:tgtEl>
+                </p:cond>
+              </p:prevCondLst>
+              <p:nextCondLst>
+                <p:cond evt="onNext" delay="0">
+                  <p:tgtEl>
+                    <p:sldTgt/>
+                  </p:tgtEl>
+                </p:cond>
+              </p:nextCondLst>
+            </p:seq>
+            <p:video>
+              <p:cMediaNode>
+                <p:cTn id="7" fill="hold" display="0">
+                  <p:stCondLst>
+                    <p:cond delay="indefinite"/>
+                  </p:stCondLst>
+                  <p:endCondLst>
+                    <p:cond evt="onNext" delay="0">
+                      <p:tgtEl>
+                        <p:sldTgt/>
+                      </p:tgtEl>
+                    </p:cond>
+                    <p:cond evt="onPrev" delay="0">
+                      <p:tgtEl>
+                        <p:sldTgt/>
+                      </p:tgtEl>
+                    </p:cond>
+                  </p:endCondLst>
+                </p:cTn>
+                <p:tgtEl>
+                  <p:spTgt spid="10"/>
+                </p:tgtEl>
+              </p:cMediaNode>
+            </p:video>
+            <p:seq concurrent="1" nextAc="seek">
+              <p:cTn id="8" restart="whenNotActive" fill="hold" evtFilter="cancelBubble" nodeType="interactiveSeq">
+                <p:stCondLst>
+                  <p:cond evt="onClick" delay="0">
+                    <p:tgtEl>
+                      <p:spTgt spid="10"/>
+                    </p:tgtEl>
+                  </p:cond>
+                </p:stCondLst>
+                <p:endSync evt="end" delay="0">
+                  <p:rtn val="all"/>
+                </p:endSync>
+                <p:childTnLst>
+                  <p:par>
+                    <p:cTn id="9" fill="hold">
+                      <p:stCondLst>
+                        <p:cond delay="0"/>
+                      </p:stCondLst>
+                      <p:childTnLst>
+                        <p:par>
+                          <p:cTn id="10" fill="hold">
+                            <p:stCondLst>
+                              <p:cond delay="0"/>
+                            </p:stCondLst>
+                            <p:childTnLst>
+                              <p:par>
+                                <p:cTn id="11" presetID="2" presetClass="mediacall" presetSubtype="0" fill="hold" nodeType="clickEffect">
+                                  <p:stCondLst>
+                                    <p:cond delay="0"/>
+                                  </p:stCondLst>
+                                  <p:childTnLst>
+                                    <p:cmd type="call" cmd="togglePause">
+                                      <p:cBhvr>
+                                        <p:cTn id="12" dur="1" fill="hold"/>
+                                        <p:tgtEl>
+                                          <p:spTgt spid="10"/>
+                                        </p:tgtEl>
+                                      </p:cBhvr>
+                                    </p:cmd>
+                                  </p:childTnLst>
+                                </p:cTn>
+                              </p:par>
+                            </p:childTnLst>
+                          </p:cTn>
+                        </p:par>
+                      </p:childTnLst>
+                    </p:cTn>
+                  </p:par>
+                </p:childTnLst>
+              </p:cTn>
+              <p:nextCondLst>
+                <p:cond evt="onClick" delay="0">
+                  <p:tgtEl>
+                    <p:spTgt spid="10"/>
+                  </p:tgtEl>
+                </p:cond>
+              </p:nextCondLst>
+            </p:seq>
+          </p:childTnLst>
+        </p:cTn>
+      </p:par>
+    </p:tnLst>
+  </p:timing>
+</p:sld>
+</file>
+
+<file path=ppt/slides/slide2.xml><?xml version="1.0" encoding="utf-8"?>
+<p:sld xmlns:a="http://schemas.openxmlformats.org/drawingml/2006/main" xmlns:r="http://schemas.openxmlformats.org/officeDocument/2006/relationships" xmlns:p="http://schemas.openxmlformats.org/presentationml/2006/main">
+  <p:cSld>
+    <p:spTree>
+      <p:nvGrpSpPr>
+        <p:cNvPr id="1" name=""/>
+        <p:cNvGrpSpPr/>
+        <p:nvPr/>
+      </p:nvGrpSpPr>
+      <p:grpSpPr>
+        <a:xfrm>
+          <a:off x="0" y="0"/>
+          <a:ext cx="0" cy="0"/>
+          <a:chOff x="0" y="0"/>
+          <a:chExt cx="0" cy="0"/>
+        </a:xfrm>
+      </p:grpSpPr>
+      <p:sp>
+        <p:nvSpPr>
+          <p:cNvPr id="130" name="CustomShape 1"/>
+          <p:cNvSpPr/>
+          <p:nvPr/>
+        </p:nvSpPr>
+        <p:spPr>
+          <a:xfrm>
+            <a:off x="683640" y="1196640"/>
+            <a:ext cx="7771680" cy="614880"/>
+          </a:xfrm>
+          <a:prstGeom prst="rect">
+            <a:avLst/>
+          </a:prstGeom>
+          <a:noFill/>
+          <a:ln>
+            <a:noFill/>
+          </a:ln>
+        </p:spPr>
+        <p:style>
+          <a:lnRef idx="0">
+            <a:scrgbClr r="0" g="0" b="0"/>
+          </a:lnRef>
+          <a:fillRef idx="0">
+            <a:scrgbClr r="0" g="0" b="0"/>
+          </a:fillRef>
+          <a:effectRef idx="0">
+            <a:scrgbClr r="0" g="0" b="0"/>
+          </a:effectRef>
+          <a:fontRef idx="minor"/>
+        </p:style>
+        <p:txBody>
+          <a:bodyPr lIns="0" tIns="0" rIns="0" bIns="0"/>
+          <a:lstStyle/>
+          <a:p>
+            <a:pPr>
+              <a:lnSpc>
+                <a:spcPct val="100000"/>
+              </a:lnSpc>
+            </a:pPr>
+            <a:r>
+              <a:rPr lang="de-DE" sz="4000" b="1" strike="noStrike" cap="small" spc="-1">
+                <a:solidFill>
+                  <a:srgbClr val="2D2015"/>
+                </a:solidFill>
+                <a:uFill>
+                  <a:solidFill>
+                    <a:srgbClr val="FFFFFF"/>
+                  </a:solidFill>
+                </a:uFill>
+                <a:latin typeface="Arial"/>
+              </a:rPr>
+              <a:t>Inhalt</a:t>
+            </a:r>
+            <a:endParaRPr lang="de-DE" sz="1800" b="0" strike="noStrike" spc="-1">
+              <a:solidFill>
+                <a:srgbClr val="000000"/>
+              </a:solidFill>
+              <a:uFill>
+                <a:solidFill>
+                  <a:srgbClr val="FFFFFF"/>
+                </a:solidFill>
+              </a:uFill>
+              <a:latin typeface="Arial"/>
+            </a:endParaRPr>
+          </a:p>
+        </p:txBody>
+      </p:sp>
+      <p:sp>
+        <p:nvSpPr>
+          <p:cNvPr id="131" name="CustomShape 2"/>
+          <p:cNvSpPr/>
+          <p:nvPr/>
+        </p:nvSpPr>
+        <p:spPr>
+          <a:xfrm>
+            <a:off x="683640" y="1989000"/>
+            <a:ext cx="4103640" cy="2010240"/>
+          </a:xfrm>
+          <a:prstGeom prst="rect">
+            <a:avLst/>
+          </a:prstGeom>
+          <a:noFill/>
+          <a:ln>
+            <a:noFill/>
+          </a:ln>
+        </p:spPr>
+        <p:style>
+          <a:lnRef idx="0">
+            <a:scrgbClr r="0" g="0" b="0"/>
+          </a:lnRef>
+          <a:fillRef idx="0">
+            <a:scrgbClr r="0" g="0" b="0"/>
+          </a:fillRef>
+          <a:effectRef idx="0">
+            <a:scrgbClr r="0" g="0" b="0"/>
+          </a:effectRef>
+          <a:fontRef idx="minor"/>
+        </p:style>
+        <p:txBody>
+          <a:bodyPr lIns="90000" tIns="45000" rIns="90000" bIns="45000"/>
+          <a:lstStyle/>
+          <a:p>
+            <a:pPr marL="343080" indent="-342360">
+              <a:lnSpc>
+                <a:spcPct val="100000"/>
+              </a:lnSpc>
+              <a:buClr>
+                <a:srgbClr val="333333"/>
+              </a:buClr>
+              <a:buFont typeface="Arial"/>
+              <a:buAutoNum type="arabicPeriod"/>
+            </a:pPr>
+            <a:r>
+              <a:rPr lang="de-DE" sz="1800" b="0" strike="noStrike" spc="-1">
+                <a:solidFill>
+                  <a:srgbClr val="333333"/>
+                </a:solidFill>
+                <a:uFill>
+                  <a:solidFill>
+                    <a:srgbClr val="FFFFFF"/>
+                  </a:solidFill>
+                </a:uFill>
+                <a:latin typeface="Arial"/>
+                <a:ea typeface="DejaVu Sans"/>
+              </a:rPr>
+              <a:t>WebProjectManagment</a:t>
+            </a:r>
+            <a:endParaRPr lang="de-DE" sz="1800" b="0" strike="noStrike" spc="-1">
+              <a:solidFill>
+                <a:srgbClr val="000000"/>
+              </a:solidFill>
+              <a:uFill>
+                <a:solidFill>
+                  <a:srgbClr val="FFFFFF"/>
+                </a:solidFill>
+              </a:uFill>
+              <a:latin typeface="Arial"/>
+            </a:endParaRPr>
+          </a:p>
+          <a:p>
+            <a:pPr marL="343080" indent="-342360">
+              <a:lnSpc>
+                <a:spcPct val="100000"/>
+              </a:lnSpc>
+              <a:buClr>
+                <a:srgbClr val="333333"/>
+              </a:buClr>
+              <a:buFont typeface="Arial"/>
+              <a:buAutoNum type="arabicPeriod"/>
+            </a:pPr>
+            <a:r>
+              <a:rPr lang="de-DE" sz="1800" b="0" strike="noStrike" spc="-1">
+                <a:solidFill>
+                  <a:srgbClr val="333333"/>
+                </a:solidFill>
+                <a:uFill>
+                  <a:solidFill>
+                    <a:srgbClr val="FFFFFF"/>
+                  </a:solidFill>
+                </a:uFill>
+                <a:latin typeface="Arial"/>
+                <a:ea typeface="DejaVu Sans"/>
+              </a:rPr>
+              <a:t>Embedded Systems</a:t>
+            </a:r>
+            <a:endParaRPr lang="de-DE" sz="1800" b="0" strike="noStrike" spc="-1">
+              <a:solidFill>
+                <a:srgbClr val="000000"/>
+              </a:solidFill>
+              <a:uFill>
+                <a:solidFill>
+                  <a:srgbClr val="FFFFFF"/>
+                </a:solidFill>
+              </a:uFill>
+              <a:latin typeface="Arial"/>
+            </a:endParaRPr>
+          </a:p>
+          <a:p>
+            <a:pPr marL="343080" indent="-342360">
+              <a:lnSpc>
+                <a:spcPct val="100000"/>
+              </a:lnSpc>
+              <a:buClr>
+                <a:srgbClr val="333333"/>
+              </a:buClr>
+              <a:buFont typeface="Arial"/>
+              <a:buAutoNum type="arabicPeriod"/>
+            </a:pPr>
+            <a:r>
+              <a:rPr lang="de-DE" sz="1800" b="0" strike="noStrike" spc="-1">
+                <a:solidFill>
+                  <a:srgbClr val="333333"/>
+                </a:solidFill>
+                <a:uFill>
+                  <a:solidFill>
+                    <a:srgbClr val="FFFFFF"/>
+                  </a:solidFill>
+                </a:uFill>
+                <a:latin typeface="Arial"/>
+                <a:ea typeface="DejaVu Sans"/>
+              </a:rPr>
+              <a:t>GUI</a:t>
+            </a:r>
+            <a:endParaRPr lang="de-DE" sz="1800" b="0" strike="noStrike" spc="-1">
+              <a:solidFill>
+                <a:srgbClr val="000000"/>
+              </a:solidFill>
+              <a:uFill>
+                <a:solidFill>
+                  <a:srgbClr val="FFFFFF"/>
+                </a:solidFill>
+              </a:uFill>
+              <a:latin typeface="Arial"/>
+            </a:endParaRPr>
+          </a:p>
+          <a:p>
+            <a:pPr marL="343080" indent="-342360">
+              <a:lnSpc>
+                <a:spcPct val="100000"/>
+              </a:lnSpc>
+              <a:buClr>
+                <a:srgbClr val="333333"/>
+              </a:buClr>
+              <a:buFont typeface="Arial"/>
+              <a:buAutoNum type="arabicPeriod"/>
+            </a:pPr>
+            <a:r>
+              <a:rPr lang="de-DE" sz="1800" b="0" strike="noStrike" spc="-1">
+                <a:solidFill>
+                  <a:srgbClr val="333333"/>
+                </a:solidFill>
+                <a:uFill>
+                  <a:solidFill>
+                    <a:srgbClr val="FFFFFF"/>
+                  </a:solidFill>
+                </a:uFill>
+                <a:latin typeface="Arial"/>
+                <a:ea typeface="DejaVu Sans"/>
+              </a:rPr>
+              <a:t>Datenbanken</a:t>
+            </a:r>
+            <a:endParaRPr lang="de-DE" sz="1800" b="0" strike="noStrike" spc="-1">
+              <a:solidFill>
+                <a:srgbClr val="000000"/>
+              </a:solidFill>
+              <a:uFill>
+                <a:solidFill>
+                  <a:srgbClr val="FFFFFF"/>
+                </a:solidFill>
+              </a:uFill>
+              <a:latin typeface="Arial"/>
+            </a:endParaRPr>
+          </a:p>
+          <a:p>
+            <a:pPr marL="343080" indent="-342360">
+              <a:lnSpc>
+                <a:spcPct val="100000"/>
+              </a:lnSpc>
+              <a:buClr>
+                <a:srgbClr val="333333"/>
+              </a:buClr>
+              <a:buFont typeface="Arial"/>
+              <a:buAutoNum type="arabicPeriod"/>
+            </a:pPr>
+            <a:r>
+              <a:rPr lang="de-DE" sz="1800" b="0" strike="noStrike" spc="-1">
+                <a:solidFill>
+                  <a:srgbClr val="333333"/>
+                </a:solidFill>
+                <a:uFill>
+                  <a:solidFill>
+                    <a:srgbClr val="FFFFFF"/>
+                  </a:solidFill>
+                </a:uFill>
+                <a:latin typeface="Arial"/>
+                <a:ea typeface="DejaVu Sans"/>
+              </a:rPr>
+              <a:t>Applikation</a:t>
+            </a:r>
+            <a:endParaRPr lang="de-DE" sz="1800" b="0" strike="noStrike" spc="-1">
+              <a:solidFill>
+                <a:srgbClr val="000000"/>
+              </a:solidFill>
+              <a:uFill>
+                <a:solidFill>
+                  <a:srgbClr val="FFFFFF"/>
+                </a:solidFill>
+              </a:uFill>
+              <a:latin typeface="Arial"/>
+            </a:endParaRPr>
+          </a:p>
+          <a:p>
+            <a:pPr marL="343080" indent="-342360">
+              <a:lnSpc>
+                <a:spcPct val="100000"/>
+              </a:lnSpc>
+              <a:buClr>
+                <a:srgbClr val="333333"/>
+              </a:buClr>
+              <a:buFont typeface="Arial"/>
+              <a:buAutoNum type="arabicPeriod"/>
+            </a:pPr>
+            <a:r>
+              <a:rPr lang="de-DE" sz="1800" b="0" strike="noStrike" spc="-1">
+                <a:solidFill>
+                  <a:srgbClr val="333333"/>
+                </a:solidFill>
+                <a:uFill>
+                  <a:solidFill>
+                    <a:srgbClr val="FFFFFF"/>
+                  </a:solidFill>
+                </a:uFill>
+                <a:latin typeface="Arial"/>
+                <a:ea typeface="DejaVu Sans"/>
+              </a:rPr>
+              <a:t>Fragen</a:t>
+            </a:r>
+            <a:endParaRPr lang="de-DE" sz="1800" b="0" strike="noStrike" spc="-1">
+              <a:solidFill>
+                <a:srgbClr val="000000"/>
+              </a:solidFill>
+              <a:uFill>
+                <a:solidFill>
+                  <a:srgbClr val="FFFFFF"/>
+                </a:solidFill>
+              </a:uFill>
+              <a:latin typeface="Arial"/>
+            </a:endParaRPr>
+          </a:p>
+          <a:p>
+            <a:pPr marL="343080" indent="-342360">
+              <a:lnSpc>
+                <a:spcPct val="100000"/>
+              </a:lnSpc>
+              <a:buClr>
+                <a:srgbClr val="333333"/>
+              </a:buClr>
+              <a:buFont typeface="Arial"/>
+              <a:buAutoNum type="arabicPeriod"/>
+            </a:pPr>
+            <a:r>
+              <a:rPr lang="de-DE" sz="1800" b="0" strike="noStrike" spc="-1">
+                <a:solidFill>
+                  <a:srgbClr val="333333"/>
+                </a:solidFill>
+                <a:uFill>
+                  <a:solidFill>
+                    <a:srgbClr val="FFFFFF"/>
+                  </a:solidFill>
+                </a:uFill>
+                <a:latin typeface="Arial"/>
+                <a:ea typeface="DejaVu Sans"/>
+              </a:rPr>
+              <a:t>Live 	</a:t>
+            </a:r>
+            <a:endParaRPr lang="de-DE" sz="1800" b="0" strike="noStrike" spc="-1">
+              <a:solidFill>
+                <a:srgbClr val="000000"/>
+              </a:solidFill>
+              <a:uFill>
+                <a:solidFill>
+                  <a:srgbClr val="FFFFFF"/>
+                </a:solidFill>
+              </a:uFill>
+              <a:latin typeface="Arial"/>
+            </a:endParaRPr>
+          </a:p>
+        </p:txBody>
+      </p:sp>
+    </p:spTree>
+  </p:cSld>
+  <p:clrMapOvr>
+    <a:masterClrMapping/>
+  </p:clrMapOvr>
+  <p:timing>
+    <p:tnLst>
+      <p:par>
+        <p:cTn id="1" dur="indefinite" restart="never" nodeType="tmRoot">
+          <p:childTnLst>
+            <p:seq>
+              <p:cTn id="2" nodeType="mainSeq"/>
+              <p:prevCondLst>
+                <p:cond evt="onPrev" delay="0">
+                  <p:tgtEl>
+                    <p:sldTgt/>
+                  </p:tgtEl>
+                </p:cond>
+              </p:prevCondLst>
+              <p:nextCondLst>
+                <p:cond evt="onNext" delay="0">
+                  <p:tgtEl>
+                    <p:sldTgt/>
+                  </p:tgtEl>
+                </p:cond>
+              </p:nextCondLst>
+            </p:seq>
+          </p:childTnLst>
+        </p:cTn>
+      </p:par>
+    </p:tnLst>
+  </p:timing>
+</p:sld>
+</file>
+
+<file path=ppt/slides/slide20.xml><?xml version="1.0" encoding="utf-8"?>
+<p:sld xmlns:a="http://schemas.openxmlformats.org/drawingml/2006/main" xmlns:r="http://schemas.openxmlformats.org/officeDocument/2006/relationships" xmlns:p="http://schemas.openxmlformats.org/presentationml/2006/main">
+  <p:cSld>
+    <p:spTree>
+      <p:nvGrpSpPr>
+        <p:cNvPr id="1" name=""/>
+        <p:cNvGrpSpPr/>
+        <p:nvPr/>
+      </p:nvGrpSpPr>
+      <p:grpSpPr>
+        <a:xfrm>
+          <a:off x="0" y="0"/>
+          <a:ext cx="0" cy="0"/>
+          <a:chOff x="0" y="0"/>
+          <a:chExt cx="0" cy="0"/>
+        </a:xfrm>
+      </p:grpSpPr>
+      <p:pic>
+        <p:nvPicPr>
+          <p:cNvPr id="4" name="v3.mp4">
+            <a:hlinkClick r:id="" action="ppaction://media"/>
+          </p:cNvPr>
+          <p:cNvPicPr>
+            <a:picLocks noRot="1" noChangeAspect="1"/>
+          </p:cNvPicPr>
+          <p:nvPr>
+            <a:videoFile r:link="rId1"/>
+          </p:nvPr>
+        </p:nvPicPr>
+        <p:blipFill>
+          <a:blip r:embed="rId3" cstate="print"/>
+          <a:stretch>
+            <a:fillRect/>
+          </a:stretch>
+        </p:blipFill>
+        <p:spPr>
+          <a:xfrm>
+            <a:off x="1043608" y="908720"/>
+            <a:ext cx="7128792" cy="5346594"/>
+          </a:xfrm>
+          <a:prstGeom prst="rect">
+            <a:avLst/>
+          </a:prstGeom>
+        </p:spPr>
+      </p:pic>
+    </p:spTree>
+  </p:cSld>
+  <p:clrMapOvr>
+    <a:masterClrMapping/>
+  </p:clrMapOvr>
+  <p:timing>
+    <p:tnLst>
+      <p:par>
+        <p:cTn id="1" dur="indefinite" restart="never" nodeType="tmRoot">
+          <p:childTnLst>
+            <p:seq concurrent="1" nextAc="seek">
+              <p:cTn id="2" dur="indefinite" nodeType="mainSeq">
                 <p:childTnLst>
                   <p:par>
                     <p:cTn id="3" fill="hold">
@@ -9102,1605 +10924,6 @@
 </p:sld>
 </file>
 
-<file path=ppt/slides/slide17.xml><?xml version="1.0" encoding="utf-8"?>
-<p:sld xmlns:a="http://schemas.openxmlformats.org/drawingml/2006/main" xmlns:r="http://schemas.openxmlformats.org/officeDocument/2006/relationships" xmlns:p="http://schemas.openxmlformats.org/presentationml/2006/main">
-  <p:cSld>
-    <p:spTree>
-      <p:nvGrpSpPr>
-        <p:cNvPr id="1" name=""/>
-        <p:cNvGrpSpPr/>
-        <p:nvPr/>
-      </p:nvGrpSpPr>
-      <p:grpSpPr>
-        <a:xfrm>
-          <a:off x="0" y="0"/>
-          <a:ext cx="0" cy="0"/>
-          <a:chOff x="0" y="0"/>
-          <a:chExt cx="0" cy="0"/>
-        </a:xfrm>
-      </p:grpSpPr>
-      <p:sp>
-        <p:nvSpPr>
-          <p:cNvPr id="174" name="CustomShape 1"/>
-          <p:cNvSpPr/>
-          <p:nvPr/>
-        </p:nvSpPr>
-        <p:spPr>
-          <a:xfrm>
-            <a:off x="719280" y="1288080"/>
-            <a:ext cx="7700400" cy="368640"/>
-          </a:xfrm>
-          <a:prstGeom prst="rect">
-            <a:avLst/>
-          </a:prstGeom>
-          <a:noFill/>
-          <a:ln>
-            <a:noFill/>
-          </a:ln>
-        </p:spPr>
-        <p:style>
-          <a:lnRef idx="0">
-            <a:scrgbClr r="0" g="0" b="0"/>
-          </a:lnRef>
-          <a:fillRef idx="0">
-            <a:scrgbClr r="0" g="0" b="0"/>
-          </a:fillRef>
-          <a:effectRef idx="0">
-            <a:scrgbClr r="0" g="0" b="0"/>
-          </a:effectRef>
-          <a:fontRef idx="minor"/>
-        </p:style>
-        <p:txBody>
-          <a:bodyPr lIns="0" tIns="0" rIns="0" bIns="0" anchor="b"/>
-          <a:lstStyle/>
-          <a:p>
-            <a:pPr>
-              <a:lnSpc>
-                <a:spcPct val="100000"/>
-              </a:lnSpc>
-            </a:pPr>
-            <a:r>
-              <a:rPr lang="de-DE" sz="2400" b="1" strike="noStrike" spc="-1">
-                <a:solidFill>
-                  <a:srgbClr val="2D2015"/>
-                </a:solidFill>
-                <a:uFill>
-                  <a:solidFill>
-                    <a:srgbClr val="FFFFFF"/>
-                  </a:solidFill>
-                </a:uFill>
-                <a:latin typeface="Arial"/>
-              </a:rPr>
-              <a:t>GUI</a:t>
-            </a:r>
-            <a:endParaRPr lang="de-DE" sz="1800" b="0" strike="noStrike" spc="-1">
-              <a:solidFill>
-                <a:srgbClr val="000000"/>
-              </a:solidFill>
-              <a:uFill>
-                <a:solidFill>
-                  <a:srgbClr val="FFFFFF"/>
-                </a:solidFill>
-              </a:uFill>
-              <a:latin typeface="Arial"/>
-            </a:endParaRPr>
-          </a:p>
-        </p:txBody>
-      </p:sp>
-      <p:sp>
-        <p:nvSpPr>
-          <p:cNvPr id="177" name="CustomShape 2"/>
-          <p:cNvSpPr/>
-          <p:nvPr/>
-        </p:nvSpPr>
-        <p:spPr>
-          <a:xfrm>
-            <a:off x="719280" y="1773360"/>
-            <a:ext cx="7705080" cy="4352040"/>
-          </a:xfrm>
-          <a:prstGeom prst="rect">
-            <a:avLst/>
-          </a:prstGeom>
-          <a:noFill/>
-          <a:ln>
-            <a:noFill/>
-          </a:ln>
-        </p:spPr>
-        <p:style>
-          <a:lnRef idx="0">
-            <a:scrgbClr r="0" g="0" b="0"/>
-          </a:lnRef>
-          <a:fillRef idx="0">
-            <a:scrgbClr r="0" g="0" b="0"/>
-          </a:fillRef>
-          <a:effectRef idx="0">
-            <a:scrgbClr r="0" g="0" b="0"/>
-          </a:effectRef>
-          <a:fontRef idx="minor"/>
-        </p:style>
-        <p:txBody>
-          <a:bodyPr lIns="0" tIns="0" rIns="0" bIns="0"/>
-          <a:lstStyle/>
-          <a:p>
-            <a:pPr>
-              <a:lnSpc>
-                <a:spcPct val="100000"/>
-              </a:lnSpc>
-            </a:pPr>
-            <a:r>
-              <a:rPr lang="de-DE" sz="2000" b="0" strike="noStrike" spc="-1" dirty="0" smtClean="0">
-                <a:solidFill>
-                  <a:srgbClr val="333333"/>
-                </a:solidFill>
-                <a:uFill>
-                  <a:solidFill>
-                    <a:srgbClr val="FFFFFF"/>
-                  </a:solidFill>
-                </a:uFill>
-                <a:latin typeface="Arial"/>
-              </a:rPr>
-              <a:t>Aufgaben:</a:t>
-            </a:r>
-            <a:endParaRPr lang="de-DE" sz="1800" b="0" strike="noStrike" spc="-1" dirty="0">
-              <a:solidFill>
-                <a:srgbClr val="000000"/>
-              </a:solidFill>
-              <a:uFill>
-                <a:solidFill>
-                  <a:srgbClr val="FFFFFF"/>
-                </a:solidFill>
-              </a:uFill>
-              <a:latin typeface="Arial"/>
-            </a:endParaRPr>
-          </a:p>
-          <a:p>
-            <a:pPr marL="181080" indent="-180360">
-              <a:lnSpc>
-                <a:spcPct val="100000"/>
-              </a:lnSpc>
-              <a:buClr>
-                <a:srgbClr val="333333"/>
-              </a:buClr>
-            </a:pPr>
-            <a:r>
-              <a:rPr lang="de-DE" sz="2000" spc="-1" dirty="0" smtClean="0">
-                <a:solidFill>
-                  <a:srgbClr val="333333"/>
-                </a:solidFill>
-                <a:uFill>
-                  <a:solidFill>
-                    <a:srgbClr val="FFFFFF"/>
-                  </a:solidFill>
-                </a:uFill>
-                <a:latin typeface="Arial"/>
-              </a:rPr>
-              <a:t>3. Datenbankabfrage und Live-Darstellung</a:t>
-            </a:r>
-          </a:p>
-        </p:txBody>
-      </p:sp>
-      <p:pic>
-        <p:nvPicPr>
-          <p:cNvPr id="5124" name="Picture 4" descr="G:\Philipp\Desktop\praesent.png"/>
-          <p:cNvPicPr>
-            <a:picLocks noChangeAspect="1" noChangeArrowheads="1"/>
-          </p:cNvPicPr>
-          <p:nvPr/>
-        </p:nvPicPr>
-        <p:blipFill>
-          <a:blip r:embed="rId2" cstate="print"/>
-          <a:srcRect/>
-          <a:stretch>
-            <a:fillRect/>
-          </a:stretch>
-        </p:blipFill>
-        <p:spPr bwMode="auto">
-          <a:xfrm>
-            <a:off x="755576" y="3140968"/>
-            <a:ext cx="1409700" cy="2552700"/>
-          </a:xfrm>
-          <a:prstGeom prst="rect">
-            <a:avLst/>
-          </a:prstGeom>
-          <a:noFill/>
-        </p:spPr>
-      </p:pic>
-      <p:sp>
-        <p:nvSpPr>
-          <p:cNvPr id="7" name="Textfeld 6"/>
-          <p:cNvSpPr txBox="1"/>
-          <p:nvPr/>
-        </p:nvSpPr>
-        <p:spPr>
-          <a:xfrm>
-            <a:off x="683568" y="2780928"/>
-            <a:ext cx="1440160" cy="338554"/>
-          </a:xfrm>
-          <a:prstGeom prst="rect">
-            <a:avLst/>
-          </a:prstGeom>
-          <a:noFill/>
-        </p:spPr>
-        <p:txBody>
-          <a:bodyPr wrap="square" rtlCol="0">
-            <a:spAutoFit/>
-          </a:bodyPr>
-          <a:lstStyle/>
-          <a:p>
-            <a:r>
-              <a:rPr lang="de-DE" sz="1600" dirty="0" smtClean="0"/>
-              <a:t>PITIME</a:t>
-            </a:r>
-            <a:endParaRPr lang="de-DE" sz="1600" dirty="0"/>
-          </a:p>
-        </p:txBody>
-      </p:sp>
-      <p:cxnSp>
-        <p:nvCxnSpPr>
-          <p:cNvPr id="9" name="Gerade Verbindung 8"/>
-          <p:cNvCxnSpPr/>
-          <p:nvPr/>
-        </p:nvCxnSpPr>
-        <p:spPr>
-          <a:xfrm>
-            <a:off x="2267744" y="3284984"/>
-            <a:ext cx="360040" cy="144016"/>
-          </a:xfrm>
-          <a:prstGeom prst="line">
-            <a:avLst/>
-          </a:prstGeom>
-        </p:spPr>
-        <p:style>
-          <a:lnRef idx="1">
-            <a:schemeClr val="accent1"/>
-          </a:lnRef>
-          <a:fillRef idx="0">
-            <a:schemeClr val="accent1"/>
-          </a:fillRef>
-          <a:effectRef idx="0">
-            <a:schemeClr val="accent1"/>
-          </a:effectRef>
-          <a:fontRef idx="minor">
-            <a:schemeClr val="tx1"/>
-          </a:fontRef>
-        </p:style>
-      </p:cxnSp>
-      <p:cxnSp>
-        <p:nvCxnSpPr>
-          <p:cNvPr id="11" name="Gerade Verbindung 10"/>
-          <p:cNvCxnSpPr/>
-          <p:nvPr/>
-        </p:nvCxnSpPr>
-        <p:spPr>
-          <a:xfrm flipV="1">
-            <a:off x="2267744" y="3429000"/>
-            <a:ext cx="360040" cy="216024"/>
-          </a:xfrm>
-          <a:prstGeom prst="line">
-            <a:avLst/>
-          </a:prstGeom>
-        </p:spPr>
-        <p:style>
-          <a:lnRef idx="1">
-            <a:schemeClr val="accent1"/>
-          </a:lnRef>
-          <a:fillRef idx="0">
-            <a:schemeClr val="accent1"/>
-          </a:fillRef>
-          <a:effectRef idx="0">
-            <a:schemeClr val="accent1"/>
-          </a:effectRef>
-          <a:fontRef idx="minor">
-            <a:schemeClr val="tx1"/>
-          </a:fontRef>
-        </p:style>
-      </p:cxnSp>
-    </p:spTree>
-  </p:cSld>
-  <p:clrMapOvr>
-    <a:masterClrMapping/>
-  </p:clrMapOvr>
-  <p:timing>
-    <p:tnLst>
-      <p:par>
-        <p:cTn id="1" dur="indefinite" restart="never" nodeType="tmRoot">
-          <p:childTnLst>
-            <p:seq>
-              <p:cTn id="2" nodeType="mainSeq"/>
-              <p:prevCondLst>
-                <p:cond evt="onPrev" delay="0">
-                  <p:tgtEl>
-                    <p:sldTgt/>
-                  </p:tgtEl>
-                </p:cond>
-              </p:prevCondLst>
-              <p:nextCondLst>
-                <p:cond evt="onNext" delay="0">
-                  <p:tgtEl>
-                    <p:sldTgt/>
-                  </p:tgtEl>
-                </p:cond>
-              </p:nextCondLst>
-            </p:seq>
-          </p:childTnLst>
-        </p:cTn>
-      </p:par>
-    </p:tnLst>
-  </p:timing>
-</p:sld>
-</file>
-
-<file path=ppt/slides/slide18.xml><?xml version="1.0" encoding="utf-8"?>
-<p:sld xmlns:a="http://schemas.openxmlformats.org/drawingml/2006/main" xmlns:r="http://schemas.openxmlformats.org/officeDocument/2006/relationships" xmlns:p="http://schemas.openxmlformats.org/presentationml/2006/main">
-  <p:cSld>
-    <p:spTree>
-      <p:nvGrpSpPr>
-        <p:cNvPr id="1" name=""/>
-        <p:cNvGrpSpPr/>
-        <p:nvPr/>
-      </p:nvGrpSpPr>
-      <p:grpSpPr>
-        <a:xfrm>
-          <a:off x="0" y="0"/>
-          <a:ext cx="0" cy="0"/>
-          <a:chOff x="0" y="0"/>
-          <a:chExt cx="0" cy="0"/>
-        </a:xfrm>
-      </p:grpSpPr>
-      <p:sp>
-        <p:nvSpPr>
-          <p:cNvPr id="174" name="CustomShape 1"/>
-          <p:cNvSpPr/>
-          <p:nvPr/>
-        </p:nvSpPr>
-        <p:spPr>
-          <a:xfrm>
-            <a:off x="719280" y="1288080"/>
-            <a:ext cx="7700400" cy="368640"/>
-          </a:xfrm>
-          <a:prstGeom prst="rect">
-            <a:avLst/>
-          </a:prstGeom>
-          <a:noFill/>
-          <a:ln>
-            <a:noFill/>
-          </a:ln>
-        </p:spPr>
-        <p:style>
-          <a:lnRef idx="0">
-            <a:scrgbClr r="0" g="0" b="0"/>
-          </a:lnRef>
-          <a:fillRef idx="0">
-            <a:scrgbClr r="0" g="0" b="0"/>
-          </a:fillRef>
-          <a:effectRef idx="0">
-            <a:scrgbClr r="0" g="0" b="0"/>
-          </a:effectRef>
-          <a:fontRef idx="minor"/>
-        </p:style>
-        <p:txBody>
-          <a:bodyPr lIns="0" tIns="0" rIns="0" bIns="0" anchor="b"/>
-          <a:lstStyle/>
-          <a:p>
-            <a:pPr>
-              <a:lnSpc>
-                <a:spcPct val="100000"/>
-              </a:lnSpc>
-            </a:pPr>
-            <a:r>
-              <a:rPr lang="de-DE" sz="2400" b="1" strike="noStrike" spc="-1">
-                <a:solidFill>
-                  <a:srgbClr val="2D2015"/>
-                </a:solidFill>
-                <a:uFill>
-                  <a:solidFill>
-                    <a:srgbClr val="FFFFFF"/>
-                  </a:solidFill>
-                </a:uFill>
-                <a:latin typeface="Arial"/>
-              </a:rPr>
-              <a:t>GUI</a:t>
-            </a:r>
-            <a:endParaRPr lang="de-DE" sz="1800" b="0" strike="noStrike" spc="-1">
-              <a:solidFill>
-                <a:srgbClr val="000000"/>
-              </a:solidFill>
-              <a:uFill>
-                <a:solidFill>
-                  <a:srgbClr val="FFFFFF"/>
-                </a:solidFill>
-              </a:uFill>
-              <a:latin typeface="Arial"/>
-            </a:endParaRPr>
-          </a:p>
-        </p:txBody>
-      </p:sp>
-      <p:sp>
-        <p:nvSpPr>
-          <p:cNvPr id="177" name="CustomShape 2"/>
-          <p:cNvSpPr/>
-          <p:nvPr/>
-        </p:nvSpPr>
-        <p:spPr>
-          <a:xfrm>
-            <a:off x="719280" y="1773360"/>
-            <a:ext cx="7705080" cy="4352040"/>
-          </a:xfrm>
-          <a:prstGeom prst="rect">
-            <a:avLst/>
-          </a:prstGeom>
-          <a:noFill/>
-          <a:ln>
-            <a:noFill/>
-          </a:ln>
-        </p:spPr>
-        <p:style>
-          <a:lnRef idx="0">
-            <a:scrgbClr r="0" g="0" b="0"/>
-          </a:lnRef>
-          <a:fillRef idx="0">
-            <a:scrgbClr r="0" g="0" b="0"/>
-          </a:fillRef>
-          <a:effectRef idx="0">
-            <a:scrgbClr r="0" g="0" b="0"/>
-          </a:effectRef>
-          <a:fontRef idx="minor"/>
-        </p:style>
-        <p:txBody>
-          <a:bodyPr lIns="0" tIns="0" rIns="0" bIns="0"/>
-          <a:lstStyle/>
-          <a:p>
-            <a:pPr>
-              <a:lnSpc>
-                <a:spcPct val="100000"/>
-              </a:lnSpc>
-            </a:pPr>
-            <a:r>
-              <a:rPr lang="de-DE" sz="2000" b="0" strike="noStrike" spc="-1" dirty="0" smtClean="0">
-                <a:solidFill>
-                  <a:srgbClr val="333333"/>
-                </a:solidFill>
-                <a:uFill>
-                  <a:solidFill>
-                    <a:srgbClr val="FFFFFF"/>
-                  </a:solidFill>
-                </a:uFill>
-                <a:latin typeface="Arial"/>
-              </a:rPr>
-              <a:t>Aufgaben:</a:t>
-            </a:r>
-            <a:endParaRPr lang="de-DE" sz="1800" b="0" strike="noStrike" spc="-1" dirty="0">
-              <a:solidFill>
-                <a:srgbClr val="000000"/>
-              </a:solidFill>
-              <a:uFill>
-                <a:solidFill>
-                  <a:srgbClr val="FFFFFF"/>
-                </a:solidFill>
-              </a:uFill>
-              <a:latin typeface="Arial"/>
-            </a:endParaRPr>
-          </a:p>
-          <a:p>
-            <a:pPr marL="181080" indent="-180360">
-              <a:lnSpc>
-                <a:spcPct val="100000"/>
-              </a:lnSpc>
-              <a:buClr>
-                <a:srgbClr val="333333"/>
-              </a:buClr>
-            </a:pPr>
-            <a:r>
-              <a:rPr lang="de-DE" sz="2000" spc="-1" dirty="0" smtClean="0">
-                <a:solidFill>
-                  <a:srgbClr val="333333"/>
-                </a:solidFill>
-                <a:uFill>
-                  <a:solidFill>
-                    <a:srgbClr val="FFFFFF"/>
-                  </a:solidFill>
-                </a:uFill>
-                <a:latin typeface="Arial"/>
-              </a:rPr>
-              <a:t>3. Datenbankabfrage und Live-Darstellung</a:t>
-            </a:r>
-          </a:p>
-          <a:p>
-            <a:pPr marL="181080" indent="-180360">
-              <a:lnSpc>
-                <a:spcPct val="100000"/>
-              </a:lnSpc>
-              <a:buClr>
-                <a:srgbClr val="333333"/>
-              </a:buClr>
-              <a:buFont typeface="Symbol"/>
-              <a:buChar char=""/>
-            </a:pPr>
-            <a:r>
-              <a:rPr lang="de-DE" sz="2000" b="0" strike="noStrike" spc="-1" dirty="0" err="1" smtClean="0">
-                <a:solidFill>
-                  <a:srgbClr val="333333"/>
-                </a:solidFill>
-                <a:uFill>
-                  <a:solidFill>
-                    <a:srgbClr val="FFFFFF"/>
-                  </a:solidFill>
-                </a:uFill>
-                <a:latin typeface="Arial"/>
-              </a:rPr>
-              <a:t>Maven</a:t>
-            </a:r>
-            <a:r>
-              <a:rPr lang="de-DE" sz="2000" b="0" strike="noStrike" spc="-1" dirty="0" smtClean="0">
-                <a:solidFill>
-                  <a:srgbClr val="333333"/>
-                </a:solidFill>
-                <a:uFill>
-                  <a:solidFill>
-                    <a:srgbClr val="FFFFFF"/>
-                  </a:solidFill>
-                </a:uFill>
-                <a:latin typeface="Arial"/>
-              </a:rPr>
-              <a:t>-Integration, automatische Tests und </a:t>
-            </a:r>
-            <a:r>
-              <a:rPr lang="de-DE" sz="2000" b="0" strike="noStrike" spc="-1" dirty="0" err="1" smtClean="0">
-                <a:solidFill>
-                  <a:srgbClr val="333333"/>
-                </a:solidFill>
-                <a:uFill>
-                  <a:solidFill>
-                    <a:srgbClr val="FFFFFF"/>
-                  </a:solidFill>
-                </a:uFill>
-                <a:latin typeface="Arial"/>
-              </a:rPr>
-              <a:t>Javadoc</a:t>
-            </a:r>
-            <a:endParaRPr lang="de-DE" sz="1800" b="0" strike="noStrike" spc="-1" dirty="0">
-              <a:solidFill>
-                <a:srgbClr val="000000"/>
-              </a:solidFill>
-              <a:uFill>
-                <a:solidFill>
-                  <a:srgbClr val="FFFFFF"/>
-                </a:solidFill>
-              </a:uFill>
-              <a:latin typeface="Arial"/>
-            </a:endParaRPr>
-          </a:p>
-        </p:txBody>
-      </p:sp>
-    </p:spTree>
-  </p:cSld>
-  <p:clrMapOvr>
-    <a:masterClrMapping/>
-  </p:clrMapOvr>
-  <p:timing>
-    <p:tnLst>
-      <p:par>
-        <p:cTn id="1" dur="indefinite" restart="never" nodeType="tmRoot">
-          <p:childTnLst>
-            <p:seq>
-              <p:cTn id="2" nodeType="mainSeq"/>
-              <p:prevCondLst>
-                <p:cond evt="onPrev" delay="0">
-                  <p:tgtEl>
-                    <p:sldTgt/>
-                  </p:tgtEl>
-                </p:cond>
-              </p:prevCondLst>
-              <p:nextCondLst>
-                <p:cond evt="onNext" delay="0">
-                  <p:tgtEl>
-                    <p:sldTgt/>
-                  </p:tgtEl>
-                </p:cond>
-              </p:nextCondLst>
-            </p:seq>
-          </p:childTnLst>
-        </p:cTn>
-      </p:par>
-    </p:tnLst>
-  </p:timing>
-</p:sld>
-</file>
-
-<file path=ppt/slides/slide19.xml><?xml version="1.0" encoding="utf-8"?>
-<p:sld xmlns:a="http://schemas.openxmlformats.org/drawingml/2006/main" xmlns:r="http://schemas.openxmlformats.org/officeDocument/2006/relationships" xmlns:p="http://schemas.openxmlformats.org/presentationml/2006/main">
-  <p:cSld>
-    <p:spTree>
-      <p:nvGrpSpPr>
-        <p:cNvPr id="1" name=""/>
-        <p:cNvGrpSpPr/>
-        <p:nvPr/>
-      </p:nvGrpSpPr>
-      <p:grpSpPr>
-        <a:xfrm>
-          <a:off x="0" y="0"/>
-          <a:ext cx="0" cy="0"/>
-          <a:chOff x="0" y="0"/>
-          <a:chExt cx="0" cy="0"/>
-        </a:xfrm>
-      </p:grpSpPr>
-      <p:sp>
-        <p:nvSpPr>
-          <p:cNvPr id="178" name="CustomShape 1"/>
-          <p:cNvSpPr/>
-          <p:nvPr/>
-        </p:nvSpPr>
-        <p:spPr>
-          <a:xfrm>
-            <a:off x="719280" y="1288080"/>
-            <a:ext cx="7700400" cy="368640"/>
-          </a:xfrm>
-          <a:prstGeom prst="rect">
-            <a:avLst/>
-          </a:prstGeom>
-          <a:noFill/>
-          <a:ln>
-            <a:noFill/>
-          </a:ln>
-        </p:spPr>
-        <p:style>
-          <a:lnRef idx="0">
-            <a:scrgbClr r="0" g="0" b="0"/>
-          </a:lnRef>
-          <a:fillRef idx="0">
-            <a:scrgbClr r="0" g="0" b="0"/>
-          </a:fillRef>
-          <a:effectRef idx="0">
-            <a:scrgbClr r="0" g="0" b="0"/>
-          </a:effectRef>
-          <a:fontRef idx="minor"/>
-        </p:style>
-        <p:txBody>
-          <a:bodyPr lIns="0" tIns="0" rIns="0" bIns="0" anchor="b"/>
-          <a:lstStyle/>
-          <a:p>
-            <a:pPr>
-              <a:lnSpc>
-                <a:spcPct val="100000"/>
-              </a:lnSpc>
-            </a:pPr>
-            <a:r>
-              <a:rPr lang="de-DE" sz="2400" b="1" strike="noStrike" spc="-1">
-                <a:solidFill>
-                  <a:srgbClr val="2D2015"/>
-                </a:solidFill>
-                <a:uFill>
-                  <a:solidFill>
-                    <a:srgbClr val="FFFFFF"/>
-                  </a:solidFill>
-                </a:uFill>
-                <a:latin typeface="Arial"/>
-              </a:rPr>
-              <a:t>Datenbanken	</a:t>
-            </a:r>
-            <a:endParaRPr lang="de-DE" sz="1800" b="0" strike="noStrike" spc="-1">
-              <a:solidFill>
-                <a:srgbClr val="000000"/>
-              </a:solidFill>
-              <a:uFill>
-                <a:solidFill>
-                  <a:srgbClr val="FFFFFF"/>
-                </a:solidFill>
-              </a:uFill>
-              <a:latin typeface="Arial"/>
-            </a:endParaRPr>
-          </a:p>
-        </p:txBody>
-      </p:sp>
-      <p:pic>
-        <p:nvPicPr>
-          <p:cNvPr id="179" name="Bild 4"/>
-          <p:cNvPicPr/>
-          <p:nvPr/>
-        </p:nvPicPr>
-        <p:blipFill>
-          <a:blip r:embed="rId2" cstate="print"/>
-          <a:stretch/>
-        </p:blipFill>
-        <p:spPr>
-          <a:xfrm>
-            <a:off x="5192280" y="2133000"/>
-            <a:ext cx="2887560" cy="2928600"/>
-          </a:xfrm>
-          <a:prstGeom prst="rect">
-            <a:avLst/>
-          </a:prstGeom>
-          <a:ln>
-            <a:noFill/>
-          </a:ln>
-        </p:spPr>
-      </p:pic>
-      <p:pic>
-        <p:nvPicPr>
-          <p:cNvPr id="180" name="Bild 8"/>
-          <p:cNvPicPr/>
-          <p:nvPr/>
-        </p:nvPicPr>
-        <p:blipFill>
-          <a:blip r:embed="rId3" cstate="print"/>
-          <a:stretch/>
-        </p:blipFill>
-        <p:spPr>
-          <a:xfrm>
-            <a:off x="4612680" y="1202760"/>
-            <a:ext cx="1386360" cy="716760"/>
-          </a:xfrm>
-          <a:prstGeom prst="rect">
-            <a:avLst/>
-          </a:prstGeom>
-          <a:ln>
-            <a:noFill/>
-          </a:ln>
-        </p:spPr>
-      </p:pic>
-      <p:pic>
-        <p:nvPicPr>
-          <p:cNvPr id="181" name="Bild 9"/>
-          <p:cNvPicPr/>
-          <p:nvPr/>
-        </p:nvPicPr>
-        <p:blipFill>
-          <a:blip r:embed="rId4" cstate="print"/>
-          <a:stretch/>
-        </p:blipFill>
-        <p:spPr>
-          <a:xfrm>
-            <a:off x="7718760" y="5105520"/>
-            <a:ext cx="722520" cy="722520"/>
-          </a:xfrm>
-          <a:prstGeom prst="rect">
-            <a:avLst/>
-          </a:prstGeom>
-          <a:ln>
-            <a:noFill/>
-          </a:ln>
-        </p:spPr>
-      </p:pic>
-    </p:spTree>
-  </p:cSld>
-  <p:clrMapOvr>
-    <a:masterClrMapping/>
-  </p:clrMapOvr>
-  <p:timing>
-    <p:tnLst>
-      <p:par>
-        <p:cTn id="1" dur="indefinite" restart="never" nodeType="tmRoot">
-          <p:childTnLst>
-            <p:seq>
-              <p:cTn id="2" nodeType="mainSeq"/>
-              <p:prevCondLst>
-                <p:cond evt="onPrev" delay="0">
-                  <p:tgtEl>
-                    <p:sldTgt/>
-                  </p:tgtEl>
-                </p:cond>
-              </p:prevCondLst>
-              <p:nextCondLst>
-                <p:cond evt="onNext" delay="0">
-                  <p:tgtEl>
-                    <p:sldTgt/>
-                  </p:tgtEl>
-                </p:cond>
-              </p:nextCondLst>
-            </p:seq>
-          </p:childTnLst>
-        </p:cTn>
-      </p:par>
-    </p:tnLst>
-  </p:timing>
-</p:sld>
-</file>
-
-<file path=ppt/slides/slide2.xml><?xml version="1.0" encoding="utf-8"?>
-<p:sld xmlns:a="http://schemas.openxmlformats.org/drawingml/2006/main" xmlns:r="http://schemas.openxmlformats.org/officeDocument/2006/relationships" xmlns:p="http://schemas.openxmlformats.org/presentationml/2006/main">
-  <p:cSld>
-    <p:spTree>
-      <p:nvGrpSpPr>
-        <p:cNvPr id="1" name=""/>
-        <p:cNvGrpSpPr/>
-        <p:nvPr/>
-      </p:nvGrpSpPr>
-      <p:grpSpPr>
-        <a:xfrm>
-          <a:off x="0" y="0"/>
-          <a:ext cx="0" cy="0"/>
-          <a:chOff x="0" y="0"/>
-          <a:chExt cx="0" cy="0"/>
-        </a:xfrm>
-      </p:grpSpPr>
-      <p:sp>
-        <p:nvSpPr>
-          <p:cNvPr id="130" name="CustomShape 1"/>
-          <p:cNvSpPr/>
-          <p:nvPr/>
-        </p:nvSpPr>
-        <p:spPr>
-          <a:xfrm>
-            <a:off x="683640" y="1196640"/>
-            <a:ext cx="7771680" cy="614880"/>
-          </a:xfrm>
-          <a:prstGeom prst="rect">
-            <a:avLst/>
-          </a:prstGeom>
-          <a:noFill/>
-          <a:ln>
-            <a:noFill/>
-          </a:ln>
-        </p:spPr>
-        <p:style>
-          <a:lnRef idx="0">
-            <a:scrgbClr r="0" g="0" b="0"/>
-          </a:lnRef>
-          <a:fillRef idx="0">
-            <a:scrgbClr r="0" g="0" b="0"/>
-          </a:fillRef>
-          <a:effectRef idx="0">
-            <a:scrgbClr r="0" g="0" b="0"/>
-          </a:effectRef>
-          <a:fontRef idx="minor"/>
-        </p:style>
-        <p:txBody>
-          <a:bodyPr lIns="0" tIns="0" rIns="0" bIns="0"/>
-          <a:lstStyle/>
-          <a:p>
-            <a:pPr>
-              <a:lnSpc>
-                <a:spcPct val="100000"/>
-              </a:lnSpc>
-            </a:pPr>
-            <a:r>
-              <a:rPr lang="de-DE" sz="4000" b="1" strike="noStrike" cap="small" spc="-1">
-                <a:solidFill>
-                  <a:srgbClr val="2D2015"/>
-                </a:solidFill>
-                <a:uFill>
-                  <a:solidFill>
-                    <a:srgbClr val="FFFFFF"/>
-                  </a:solidFill>
-                </a:uFill>
-                <a:latin typeface="Arial"/>
-              </a:rPr>
-              <a:t>Inhalt</a:t>
-            </a:r>
-            <a:endParaRPr lang="de-DE" sz="1800" b="0" strike="noStrike" spc="-1">
-              <a:solidFill>
-                <a:srgbClr val="000000"/>
-              </a:solidFill>
-              <a:uFill>
-                <a:solidFill>
-                  <a:srgbClr val="FFFFFF"/>
-                </a:solidFill>
-              </a:uFill>
-              <a:latin typeface="Arial"/>
-            </a:endParaRPr>
-          </a:p>
-        </p:txBody>
-      </p:sp>
-      <p:sp>
-        <p:nvSpPr>
-          <p:cNvPr id="131" name="CustomShape 2"/>
-          <p:cNvSpPr/>
-          <p:nvPr/>
-        </p:nvSpPr>
-        <p:spPr>
-          <a:xfrm>
-            <a:off x="683640" y="1989000"/>
-            <a:ext cx="4103640" cy="2010240"/>
-          </a:xfrm>
-          <a:prstGeom prst="rect">
-            <a:avLst/>
-          </a:prstGeom>
-          <a:noFill/>
-          <a:ln>
-            <a:noFill/>
-          </a:ln>
-        </p:spPr>
-        <p:style>
-          <a:lnRef idx="0">
-            <a:scrgbClr r="0" g="0" b="0"/>
-          </a:lnRef>
-          <a:fillRef idx="0">
-            <a:scrgbClr r="0" g="0" b="0"/>
-          </a:fillRef>
-          <a:effectRef idx="0">
-            <a:scrgbClr r="0" g="0" b="0"/>
-          </a:effectRef>
-          <a:fontRef idx="minor"/>
-        </p:style>
-        <p:txBody>
-          <a:bodyPr lIns="90000" tIns="45000" rIns="90000" bIns="45000"/>
-          <a:lstStyle/>
-          <a:p>
-            <a:pPr marL="343080" indent="-342360">
-              <a:lnSpc>
-                <a:spcPct val="100000"/>
-              </a:lnSpc>
-              <a:buClr>
-                <a:srgbClr val="333333"/>
-              </a:buClr>
-              <a:buFont typeface="Arial"/>
-              <a:buAutoNum type="arabicPeriod"/>
-            </a:pPr>
-            <a:r>
-              <a:rPr lang="de-DE" sz="1800" b="0" strike="noStrike" spc="-1">
-                <a:solidFill>
-                  <a:srgbClr val="333333"/>
-                </a:solidFill>
-                <a:uFill>
-                  <a:solidFill>
-                    <a:srgbClr val="FFFFFF"/>
-                  </a:solidFill>
-                </a:uFill>
-                <a:latin typeface="Arial"/>
-                <a:ea typeface="DejaVu Sans"/>
-              </a:rPr>
-              <a:t>WebProjectManagment</a:t>
-            </a:r>
-            <a:endParaRPr lang="de-DE" sz="1800" b="0" strike="noStrike" spc="-1">
-              <a:solidFill>
-                <a:srgbClr val="000000"/>
-              </a:solidFill>
-              <a:uFill>
-                <a:solidFill>
-                  <a:srgbClr val="FFFFFF"/>
-                </a:solidFill>
-              </a:uFill>
-              <a:latin typeface="Arial"/>
-            </a:endParaRPr>
-          </a:p>
-          <a:p>
-            <a:pPr marL="343080" indent="-342360">
-              <a:lnSpc>
-                <a:spcPct val="100000"/>
-              </a:lnSpc>
-              <a:buClr>
-                <a:srgbClr val="333333"/>
-              </a:buClr>
-              <a:buFont typeface="Arial"/>
-              <a:buAutoNum type="arabicPeriod"/>
-            </a:pPr>
-            <a:r>
-              <a:rPr lang="de-DE" sz="1800" b="0" strike="noStrike" spc="-1">
-                <a:solidFill>
-                  <a:srgbClr val="333333"/>
-                </a:solidFill>
-                <a:uFill>
-                  <a:solidFill>
-                    <a:srgbClr val="FFFFFF"/>
-                  </a:solidFill>
-                </a:uFill>
-                <a:latin typeface="Arial"/>
-                <a:ea typeface="DejaVu Sans"/>
-              </a:rPr>
-              <a:t>Embedded Systems</a:t>
-            </a:r>
-            <a:endParaRPr lang="de-DE" sz="1800" b="0" strike="noStrike" spc="-1">
-              <a:solidFill>
-                <a:srgbClr val="000000"/>
-              </a:solidFill>
-              <a:uFill>
-                <a:solidFill>
-                  <a:srgbClr val="FFFFFF"/>
-                </a:solidFill>
-              </a:uFill>
-              <a:latin typeface="Arial"/>
-            </a:endParaRPr>
-          </a:p>
-          <a:p>
-            <a:pPr marL="343080" indent="-342360">
-              <a:lnSpc>
-                <a:spcPct val="100000"/>
-              </a:lnSpc>
-              <a:buClr>
-                <a:srgbClr val="333333"/>
-              </a:buClr>
-              <a:buFont typeface="Arial"/>
-              <a:buAutoNum type="arabicPeriod"/>
-            </a:pPr>
-            <a:r>
-              <a:rPr lang="de-DE" sz="1800" b="0" strike="noStrike" spc="-1">
-                <a:solidFill>
-                  <a:srgbClr val="333333"/>
-                </a:solidFill>
-                <a:uFill>
-                  <a:solidFill>
-                    <a:srgbClr val="FFFFFF"/>
-                  </a:solidFill>
-                </a:uFill>
-                <a:latin typeface="Arial"/>
-                <a:ea typeface="DejaVu Sans"/>
-              </a:rPr>
-              <a:t>GUI</a:t>
-            </a:r>
-            <a:endParaRPr lang="de-DE" sz="1800" b="0" strike="noStrike" spc="-1">
-              <a:solidFill>
-                <a:srgbClr val="000000"/>
-              </a:solidFill>
-              <a:uFill>
-                <a:solidFill>
-                  <a:srgbClr val="FFFFFF"/>
-                </a:solidFill>
-              </a:uFill>
-              <a:latin typeface="Arial"/>
-            </a:endParaRPr>
-          </a:p>
-          <a:p>
-            <a:pPr marL="343080" indent="-342360">
-              <a:lnSpc>
-                <a:spcPct val="100000"/>
-              </a:lnSpc>
-              <a:buClr>
-                <a:srgbClr val="333333"/>
-              </a:buClr>
-              <a:buFont typeface="Arial"/>
-              <a:buAutoNum type="arabicPeriod"/>
-            </a:pPr>
-            <a:r>
-              <a:rPr lang="de-DE" sz="1800" b="0" strike="noStrike" spc="-1">
-                <a:solidFill>
-                  <a:srgbClr val="333333"/>
-                </a:solidFill>
-                <a:uFill>
-                  <a:solidFill>
-                    <a:srgbClr val="FFFFFF"/>
-                  </a:solidFill>
-                </a:uFill>
-                <a:latin typeface="Arial"/>
-                <a:ea typeface="DejaVu Sans"/>
-              </a:rPr>
-              <a:t>Datenbanken</a:t>
-            </a:r>
-            <a:endParaRPr lang="de-DE" sz="1800" b="0" strike="noStrike" spc="-1">
-              <a:solidFill>
-                <a:srgbClr val="000000"/>
-              </a:solidFill>
-              <a:uFill>
-                <a:solidFill>
-                  <a:srgbClr val="FFFFFF"/>
-                </a:solidFill>
-              </a:uFill>
-              <a:latin typeface="Arial"/>
-            </a:endParaRPr>
-          </a:p>
-          <a:p>
-            <a:pPr marL="343080" indent="-342360">
-              <a:lnSpc>
-                <a:spcPct val="100000"/>
-              </a:lnSpc>
-              <a:buClr>
-                <a:srgbClr val="333333"/>
-              </a:buClr>
-              <a:buFont typeface="Arial"/>
-              <a:buAutoNum type="arabicPeriod"/>
-            </a:pPr>
-            <a:r>
-              <a:rPr lang="de-DE" sz="1800" b="0" strike="noStrike" spc="-1">
-                <a:solidFill>
-                  <a:srgbClr val="333333"/>
-                </a:solidFill>
-                <a:uFill>
-                  <a:solidFill>
-                    <a:srgbClr val="FFFFFF"/>
-                  </a:solidFill>
-                </a:uFill>
-                <a:latin typeface="Arial"/>
-                <a:ea typeface="DejaVu Sans"/>
-              </a:rPr>
-              <a:t>Applikation</a:t>
-            </a:r>
-            <a:endParaRPr lang="de-DE" sz="1800" b="0" strike="noStrike" spc="-1">
-              <a:solidFill>
-                <a:srgbClr val="000000"/>
-              </a:solidFill>
-              <a:uFill>
-                <a:solidFill>
-                  <a:srgbClr val="FFFFFF"/>
-                </a:solidFill>
-              </a:uFill>
-              <a:latin typeface="Arial"/>
-            </a:endParaRPr>
-          </a:p>
-          <a:p>
-            <a:pPr marL="343080" indent="-342360">
-              <a:lnSpc>
-                <a:spcPct val="100000"/>
-              </a:lnSpc>
-              <a:buClr>
-                <a:srgbClr val="333333"/>
-              </a:buClr>
-              <a:buFont typeface="Arial"/>
-              <a:buAutoNum type="arabicPeriod"/>
-            </a:pPr>
-            <a:r>
-              <a:rPr lang="de-DE" sz="1800" b="0" strike="noStrike" spc="-1">
-                <a:solidFill>
-                  <a:srgbClr val="333333"/>
-                </a:solidFill>
-                <a:uFill>
-                  <a:solidFill>
-                    <a:srgbClr val="FFFFFF"/>
-                  </a:solidFill>
-                </a:uFill>
-                <a:latin typeface="Arial"/>
-                <a:ea typeface="DejaVu Sans"/>
-              </a:rPr>
-              <a:t>Fragen</a:t>
-            </a:r>
-            <a:endParaRPr lang="de-DE" sz="1800" b="0" strike="noStrike" spc="-1">
-              <a:solidFill>
-                <a:srgbClr val="000000"/>
-              </a:solidFill>
-              <a:uFill>
-                <a:solidFill>
-                  <a:srgbClr val="FFFFFF"/>
-                </a:solidFill>
-              </a:uFill>
-              <a:latin typeface="Arial"/>
-            </a:endParaRPr>
-          </a:p>
-          <a:p>
-            <a:pPr marL="343080" indent="-342360">
-              <a:lnSpc>
-                <a:spcPct val="100000"/>
-              </a:lnSpc>
-              <a:buClr>
-                <a:srgbClr val="333333"/>
-              </a:buClr>
-              <a:buFont typeface="Arial"/>
-              <a:buAutoNum type="arabicPeriod"/>
-            </a:pPr>
-            <a:r>
-              <a:rPr lang="de-DE" sz="1800" b="0" strike="noStrike" spc="-1">
-                <a:solidFill>
-                  <a:srgbClr val="333333"/>
-                </a:solidFill>
-                <a:uFill>
-                  <a:solidFill>
-                    <a:srgbClr val="FFFFFF"/>
-                  </a:solidFill>
-                </a:uFill>
-                <a:latin typeface="Arial"/>
-                <a:ea typeface="DejaVu Sans"/>
-              </a:rPr>
-              <a:t>Live 	</a:t>
-            </a:r>
-            <a:endParaRPr lang="de-DE" sz="1800" b="0" strike="noStrike" spc="-1">
-              <a:solidFill>
-                <a:srgbClr val="000000"/>
-              </a:solidFill>
-              <a:uFill>
-                <a:solidFill>
-                  <a:srgbClr val="FFFFFF"/>
-                </a:solidFill>
-              </a:uFill>
-              <a:latin typeface="Arial"/>
-            </a:endParaRPr>
-          </a:p>
-        </p:txBody>
-      </p:sp>
-    </p:spTree>
-  </p:cSld>
-  <p:clrMapOvr>
-    <a:masterClrMapping/>
-  </p:clrMapOvr>
-  <p:timing>
-    <p:tnLst>
-      <p:par>
-        <p:cTn id="1" dur="indefinite" restart="never" nodeType="tmRoot">
-          <p:childTnLst>
-            <p:seq>
-              <p:cTn id="2" nodeType="mainSeq"/>
-              <p:prevCondLst>
-                <p:cond evt="onPrev" delay="0">
-                  <p:tgtEl>
-                    <p:sldTgt/>
-                  </p:tgtEl>
-                </p:cond>
-              </p:prevCondLst>
-              <p:nextCondLst>
-                <p:cond evt="onNext" delay="0">
-                  <p:tgtEl>
-                    <p:sldTgt/>
-                  </p:tgtEl>
-                </p:cond>
-              </p:nextCondLst>
-            </p:seq>
-          </p:childTnLst>
-        </p:cTn>
-      </p:par>
-    </p:tnLst>
-  </p:timing>
-</p:sld>
-</file>
-
-<file path=ppt/slides/slide20.xml><?xml version="1.0" encoding="utf-8"?>
-<p:sld xmlns:a="http://schemas.openxmlformats.org/drawingml/2006/main" xmlns:r="http://schemas.openxmlformats.org/officeDocument/2006/relationships" xmlns:p="http://schemas.openxmlformats.org/presentationml/2006/main">
-  <p:cSld>
-    <p:spTree>
-      <p:nvGrpSpPr>
-        <p:cNvPr id="1" name=""/>
-        <p:cNvGrpSpPr/>
-        <p:nvPr/>
-      </p:nvGrpSpPr>
-      <p:grpSpPr>
-        <a:xfrm>
-          <a:off x="0" y="0"/>
-          <a:ext cx="0" cy="0"/>
-          <a:chOff x="0" y="0"/>
-          <a:chExt cx="0" cy="0"/>
-        </a:xfrm>
-      </p:grpSpPr>
-      <p:sp>
-        <p:nvSpPr>
-          <p:cNvPr id="182" name="CustomShape 1"/>
-          <p:cNvSpPr/>
-          <p:nvPr/>
-        </p:nvSpPr>
-        <p:spPr>
-          <a:xfrm>
-            <a:off x="719280" y="1288080"/>
-            <a:ext cx="7700400" cy="368640"/>
-          </a:xfrm>
-          <a:prstGeom prst="rect">
-            <a:avLst/>
-          </a:prstGeom>
-          <a:noFill/>
-          <a:ln>
-            <a:noFill/>
-          </a:ln>
-        </p:spPr>
-        <p:style>
-          <a:lnRef idx="0">
-            <a:scrgbClr r="0" g="0" b="0"/>
-          </a:lnRef>
-          <a:fillRef idx="0">
-            <a:scrgbClr r="0" g="0" b="0"/>
-          </a:fillRef>
-          <a:effectRef idx="0">
-            <a:scrgbClr r="0" g="0" b="0"/>
-          </a:effectRef>
-          <a:fontRef idx="minor"/>
-        </p:style>
-        <p:txBody>
-          <a:bodyPr lIns="0" tIns="0" rIns="0" bIns="0" anchor="b"/>
-          <a:lstStyle/>
-          <a:p>
-            <a:pPr>
-              <a:lnSpc>
-                <a:spcPct val="100000"/>
-              </a:lnSpc>
-            </a:pPr>
-            <a:r>
-              <a:rPr lang="de-DE" sz="2400" b="1" strike="noStrike" spc="-1">
-                <a:solidFill>
-                  <a:srgbClr val="2D2015"/>
-                </a:solidFill>
-                <a:uFill>
-                  <a:solidFill>
-                    <a:srgbClr val="FFFFFF"/>
-                  </a:solidFill>
-                </a:uFill>
-                <a:latin typeface="Arial"/>
-              </a:rPr>
-              <a:t>Applikation</a:t>
-            </a:r>
-            <a:endParaRPr lang="de-DE" sz="1800" b="0" strike="noStrike" spc="-1">
-              <a:solidFill>
-                <a:srgbClr val="000000"/>
-              </a:solidFill>
-              <a:uFill>
-                <a:solidFill>
-                  <a:srgbClr val="FFFFFF"/>
-                </a:solidFill>
-              </a:uFill>
-              <a:latin typeface="Arial"/>
-            </a:endParaRPr>
-          </a:p>
-        </p:txBody>
-      </p:sp>
-      <p:sp>
-        <p:nvSpPr>
-          <p:cNvPr id="183" name="CustomShape 2"/>
-          <p:cNvSpPr/>
-          <p:nvPr/>
-        </p:nvSpPr>
-        <p:spPr>
-          <a:xfrm>
-            <a:off x="719280" y="1773360"/>
-            <a:ext cx="7705080" cy="4352040"/>
-          </a:xfrm>
-          <a:prstGeom prst="rect">
-            <a:avLst/>
-          </a:prstGeom>
-          <a:noFill/>
-          <a:ln>
-            <a:noFill/>
-          </a:ln>
-        </p:spPr>
-        <p:style>
-          <a:lnRef idx="0">
-            <a:scrgbClr r="0" g="0" b="0"/>
-          </a:lnRef>
-          <a:fillRef idx="0">
-            <a:scrgbClr r="0" g="0" b="0"/>
-          </a:fillRef>
-          <a:effectRef idx="0">
-            <a:scrgbClr r="0" g="0" b="0"/>
-          </a:effectRef>
-          <a:fontRef idx="minor"/>
-        </p:style>
-        <p:txBody>
-          <a:bodyPr lIns="0" tIns="0" rIns="0" bIns="0"/>
-          <a:lstStyle/>
-          <a:p>
-            <a:pPr>
-              <a:lnSpc>
-                <a:spcPct val="100000"/>
-              </a:lnSpc>
-            </a:pPr>
-            <a:r>
-              <a:rPr lang="de-DE" sz="2000" b="0" strike="noStrike" spc="-1">
-                <a:solidFill>
-                  <a:srgbClr val="333333"/>
-                </a:solidFill>
-                <a:uFill>
-                  <a:solidFill>
-                    <a:srgbClr val="FFFFFF"/>
-                  </a:solidFill>
-                </a:uFill>
-                <a:latin typeface="Arial"/>
-              </a:rPr>
-              <a:t>Funktionen:</a:t>
-            </a:r>
-            <a:endParaRPr lang="de-DE" sz="1800" b="0" strike="noStrike" spc="-1">
-              <a:solidFill>
-                <a:srgbClr val="000000"/>
-              </a:solidFill>
-              <a:uFill>
-                <a:solidFill>
-                  <a:srgbClr val="FFFFFF"/>
-                </a:solidFill>
-              </a:uFill>
-              <a:latin typeface="Arial"/>
-            </a:endParaRPr>
-          </a:p>
-          <a:p>
-            <a:pPr marL="181080" indent="-180360">
-              <a:lnSpc>
-                <a:spcPct val="100000"/>
-              </a:lnSpc>
-              <a:buClr>
-                <a:srgbClr val="333333"/>
-              </a:buClr>
-              <a:buFont typeface="Symbol"/>
-              <a:buChar char=""/>
-            </a:pPr>
-            <a:r>
-              <a:rPr lang="de-DE" sz="2000" b="0" strike="noStrike" spc="-1">
-                <a:solidFill>
-                  <a:srgbClr val="333333"/>
-                </a:solidFill>
-                <a:uFill>
-                  <a:solidFill>
-                    <a:srgbClr val="FFFFFF"/>
-                  </a:solidFill>
-                </a:uFill>
-                <a:latin typeface="Arial"/>
-              </a:rPr>
-              <a:t>Motor starten/stoppen</a:t>
-            </a:r>
-            <a:endParaRPr lang="de-DE" sz="1800" b="0" strike="noStrike" spc="-1">
-              <a:solidFill>
-                <a:srgbClr val="000000"/>
-              </a:solidFill>
-              <a:uFill>
-                <a:solidFill>
-                  <a:srgbClr val="FFFFFF"/>
-                </a:solidFill>
-              </a:uFill>
-              <a:latin typeface="Arial"/>
-            </a:endParaRPr>
-          </a:p>
-          <a:p>
-            <a:pPr marL="181080" indent="-180360">
-              <a:lnSpc>
-                <a:spcPct val="100000"/>
-              </a:lnSpc>
-              <a:buClr>
-                <a:srgbClr val="333333"/>
-              </a:buClr>
-              <a:buFont typeface="Symbol"/>
-              <a:buChar char=""/>
-            </a:pPr>
-            <a:r>
-              <a:rPr lang="de-DE" sz="2000" b="0" strike="noStrike" spc="-1">
-                <a:solidFill>
-                  <a:srgbClr val="333333"/>
-                </a:solidFill>
-                <a:uFill>
-                  <a:solidFill>
-                    <a:srgbClr val="FFFFFF"/>
-                  </a:solidFill>
-                </a:uFill>
-                <a:latin typeface="Arial"/>
-              </a:rPr>
-              <a:t>Rotortest</a:t>
-            </a:r>
-            <a:endParaRPr lang="de-DE" sz="1800" b="0" strike="noStrike" spc="-1">
-              <a:solidFill>
-                <a:srgbClr val="000000"/>
-              </a:solidFill>
-              <a:uFill>
-                <a:solidFill>
-                  <a:srgbClr val="FFFFFF"/>
-                </a:solidFill>
-              </a:uFill>
-              <a:latin typeface="Arial"/>
-            </a:endParaRPr>
-          </a:p>
-          <a:p>
-            <a:pPr marL="181080" indent="-180360">
-              <a:lnSpc>
-                <a:spcPct val="100000"/>
-              </a:lnSpc>
-              <a:buClr>
-                <a:srgbClr val="333333"/>
-              </a:buClr>
-              <a:buFont typeface="Symbol"/>
-              <a:buChar char=""/>
-            </a:pPr>
-            <a:r>
-              <a:rPr lang="de-DE" sz="2000" b="0" strike="noStrike" spc="-1">
-                <a:solidFill>
-                  <a:srgbClr val="333333"/>
-                </a:solidFill>
-                <a:uFill>
-                  <a:solidFill>
-                    <a:srgbClr val="FFFFFF"/>
-                  </a:solidFill>
-                </a:uFill>
-                <a:latin typeface="Arial"/>
-              </a:rPr>
-              <a:t>Einzelansteuerung der Rotoren</a:t>
-            </a:r>
-            <a:endParaRPr lang="de-DE" sz="1800" b="0" strike="noStrike" spc="-1">
-              <a:solidFill>
-                <a:srgbClr val="000000"/>
-              </a:solidFill>
-              <a:uFill>
-                <a:solidFill>
-                  <a:srgbClr val="FFFFFF"/>
-                </a:solidFill>
-              </a:uFill>
-              <a:latin typeface="Arial"/>
-            </a:endParaRPr>
-          </a:p>
-          <a:p>
-            <a:pPr marL="181080" indent="-180360">
-              <a:lnSpc>
-                <a:spcPct val="100000"/>
-              </a:lnSpc>
-              <a:buClr>
-                <a:srgbClr val="333333"/>
-              </a:buClr>
-              <a:buFont typeface="Symbol"/>
-              <a:buChar char=""/>
-            </a:pPr>
-            <a:r>
-              <a:rPr lang="de-DE" sz="2000" b="0" strike="noStrike" spc="-1">
-                <a:solidFill>
-                  <a:srgbClr val="333333"/>
-                </a:solidFill>
-                <a:uFill>
-                  <a:solidFill>
-                    <a:srgbClr val="FFFFFF"/>
-                  </a:solidFill>
-                </a:uFill>
-                <a:latin typeface="Arial"/>
-              </a:rPr>
-              <a:t>Demo</a:t>
-            </a:r>
-            <a:endParaRPr lang="de-DE" sz="1800" b="0" strike="noStrike" spc="-1">
-              <a:solidFill>
-                <a:srgbClr val="000000"/>
-              </a:solidFill>
-              <a:uFill>
-                <a:solidFill>
-                  <a:srgbClr val="FFFFFF"/>
-                </a:solidFill>
-              </a:uFill>
-              <a:latin typeface="Arial"/>
-            </a:endParaRPr>
-          </a:p>
-        </p:txBody>
-      </p:sp>
-      <p:pic>
-        <p:nvPicPr>
-          <p:cNvPr id="184" name="Bild 3"/>
-          <p:cNvPicPr/>
-          <p:nvPr/>
-        </p:nvPicPr>
-        <p:blipFill>
-          <a:blip r:embed="rId2" cstate="print"/>
-          <a:stretch/>
-        </p:blipFill>
-        <p:spPr>
-          <a:xfrm>
-            <a:off x="6012000" y="1364760"/>
-            <a:ext cx="1945800" cy="3737520"/>
-          </a:xfrm>
-          <a:prstGeom prst="rect">
-            <a:avLst/>
-          </a:prstGeom>
-          <a:ln>
-            <a:noFill/>
-          </a:ln>
-        </p:spPr>
-      </p:pic>
-      <p:pic>
-        <p:nvPicPr>
-          <p:cNvPr id="185" name="Bild 4"/>
-          <p:cNvPicPr/>
-          <p:nvPr/>
-        </p:nvPicPr>
-        <p:blipFill>
-          <a:blip r:embed="rId3" cstate="print"/>
-          <a:srcRect l="10601" r="18819"/>
-          <a:stretch/>
-        </p:blipFill>
-        <p:spPr>
-          <a:xfrm>
-            <a:off x="2051640" y="4077000"/>
-            <a:ext cx="2159280" cy="1717200"/>
-          </a:xfrm>
-          <a:prstGeom prst="rect">
-            <a:avLst/>
-          </a:prstGeom>
-          <a:ln>
-            <a:noFill/>
-          </a:ln>
-        </p:spPr>
-      </p:pic>
-    </p:spTree>
-  </p:cSld>
-  <p:clrMapOvr>
-    <a:masterClrMapping/>
-  </p:clrMapOvr>
-  <p:timing>
-    <p:tnLst>
-      <p:par>
-        <p:cTn id="1" dur="indefinite" restart="never" nodeType="tmRoot">
-          <p:childTnLst>
-            <p:seq>
-              <p:cTn id="2" nodeType="mainSeq"/>
-              <p:prevCondLst>
-                <p:cond evt="onPrev" delay="0">
-                  <p:tgtEl>
-                    <p:sldTgt/>
-                  </p:tgtEl>
-                </p:cond>
-              </p:prevCondLst>
-              <p:nextCondLst>
-                <p:cond evt="onNext" delay="0">
-                  <p:tgtEl>
-                    <p:sldTgt/>
-                  </p:tgtEl>
-                </p:cond>
-              </p:nextCondLst>
-            </p:seq>
-          </p:childTnLst>
-        </p:cTn>
-      </p:par>
-    </p:tnLst>
-  </p:timing>
-</p:sld>
-</file>
-
 <file path=ppt/slides/slide21.xml><?xml version="1.0" encoding="utf-8"?>
 <p:sld xmlns:a="http://schemas.openxmlformats.org/drawingml/2006/main" xmlns:r="http://schemas.openxmlformats.org/officeDocument/2006/relationships" xmlns:p="http://schemas.openxmlformats.org/presentationml/2006/main">
   <p:cSld>
@@ -10720,13 +10943,13 @@
       </p:grpSpPr>
       <p:sp>
         <p:nvSpPr>
-          <p:cNvPr id="186" name="CustomShape 1"/>
+          <p:cNvPr id="174" name="CustomShape 1"/>
           <p:cNvSpPr/>
           <p:nvPr/>
         </p:nvSpPr>
         <p:spPr>
           <a:xfrm>
-            <a:off x="683640" y="3069000"/>
+            <a:off x="719280" y="1288080"/>
             <a:ext cx="7700400" cy="368640"/>
           </a:xfrm>
           <a:prstGeom prst="rect">
@@ -10753,7 +10976,7 @@
           <a:bodyPr lIns="0" tIns="0" rIns="0" bIns="0" anchor="b"/>
           <a:lstStyle/>
           <a:p>
-            <a:pPr algn="ctr">
+            <a:pPr>
               <a:lnSpc>
                 <a:spcPct val="100000"/>
               </a:lnSpc>
@@ -10770,9 +10993,377 @@
                 </a:uFill>
                 <a:latin typeface="Arial"/>
               </a:rPr>
-              <a:t>Fragen?</a:t>
+              <a:t>GUI</a:t>
             </a:r>
             <a:endParaRPr lang="de-DE" sz="1800" b="0" strike="noStrike" spc="-1">
+              <a:solidFill>
+                <a:srgbClr val="000000"/>
+              </a:solidFill>
+              <a:uFill>
+                <a:solidFill>
+                  <a:srgbClr val="FFFFFF"/>
+                </a:solidFill>
+              </a:uFill>
+              <a:latin typeface="Arial"/>
+            </a:endParaRPr>
+          </a:p>
+        </p:txBody>
+      </p:sp>
+      <p:sp>
+        <p:nvSpPr>
+          <p:cNvPr id="177" name="CustomShape 2"/>
+          <p:cNvSpPr/>
+          <p:nvPr/>
+        </p:nvSpPr>
+        <p:spPr>
+          <a:xfrm>
+            <a:off x="719280" y="1773360"/>
+            <a:ext cx="7705080" cy="4352040"/>
+          </a:xfrm>
+          <a:prstGeom prst="rect">
+            <a:avLst/>
+          </a:prstGeom>
+          <a:noFill/>
+          <a:ln>
+            <a:noFill/>
+          </a:ln>
+        </p:spPr>
+        <p:style>
+          <a:lnRef idx="0">
+            <a:scrgbClr r="0" g="0" b="0"/>
+          </a:lnRef>
+          <a:fillRef idx="0">
+            <a:scrgbClr r="0" g="0" b="0"/>
+          </a:fillRef>
+          <a:effectRef idx="0">
+            <a:scrgbClr r="0" g="0" b="0"/>
+          </a:effectRef>
+          <a:fontRef idx="minor"/>
+        </p:style>
+        <p:txBody>
+          <a:bodyPr lIns="0" tIns="0" rIns="0" bIns="0"/>
+          <a:lstStyle/>
+          <a:p>
+            <a:pPr>
+              <a:lnSpc>
+                <a:spcPct val="100000"/>
+              </a:lnSpc>
+            </a:pPr>
+            <a:r>
+              <a:rPr lang="de-DE" sz="2000" b="0" strike="noStrike" spc="-1" dirty="0" smtClean="0">
+                <a:solidFill>
+                  <a:srgbClr val="333333"/>
+                </a:solidFill>
+                <a:uFill>
+                  <a:solidFill>
+                    <a:srgbClr val="FFFFFF"/>
+                  </a:solidFill>
+                </a:uFill>
+                <a:latin typeface="Arial"/>
+              </a:rPr>
+              <a:t>Aufgaben:</a:t>
+            </a:r>
+            <a:endParaRPr lang="de-DE" sz="2000" b="0" strike="noStrike" spc="-1" dirty="0">
+              <a:solidFill>
+                <a:srgbClr val="000000"/>
+              </a:solidFill>
+              <a:uFill>
+                <a:solidFill>
+                  <a:srgbClr val="FFFFFF"/>
+                </a:solidFill>
+              </a:uFill>
+              <a:latin typeface="Arial"/>
+            </a:endParaRPr>
+          </a:p>
+          <a:p>
+            <a:pPr marL="181080" indent="-180360">
+              <a:lnSpc>
+                <a:spcPct val="100000"/>
+              </a:lnSpc>
+              <a:buClr>
+                <a:srgbClr val="333333"/>
+              </a:buClr>
+            </a:pPr>
+            <a:r>
+              <a:rPr lang="de-DE" sz="2000" spc="-1" dirty="0" smtClean="0">
+                <a:solidFill>
+                  <a:srgbClr val="333333"/>
+                </a:solidFill>
+                <a:uFill>
+                  <a:solidFill>
+                    <a:srgbClr val="FFFFFF"/>
+                  </a:solidFill>
+                </a:uFill>
+                <a:latin typeface="Arial"/>
+              </a:rPr>
+              <a:t>4. </a:t>
+            </a:r>
+            <a:r>
+              <a:rPr lang="de-DE" sz="2000" spc="-1" dirty="0" err="1" smtClean="0">
+                <a:solidFill>
+                  <a:srgbClr val="333333"/>
+                </a:solidFill>
+                <a:uFill>
+                  <a:solidFill>
+                    <a:srgbClr val="FFFFFF"/>
+                  </a:solidFill>
+                </a:uFill>
+                <a:latin typeface="Arial"/>
+              </a:rPr>
+              <a:t>M</a:t>
+            </a:r>
+            <a:r>
+              <a:rPr lang="de-DE" sz="2000" b="0" strike="noStrike" spc="-1" dirty="0" err="1" smtClean="0">
+                <a:solidFill>
+                  <a:srgbClr val="333333"/>
+                </a:solidFill>
+                <a:uFill>
+                  <a:solidFill>
+                    <a:srgbClr val="FFFFFF"/>
+                  </a:solidFill>
+                </a:uFill>
+                <a:latin typeface="Arial"/>
+              </a:rPr>
+              <a:t>aven</a:t>
+            </a:r>
+            <a:r>
+              <a:rPr lang="de-DE" sz="2000" b="0" strike="noStrike" spc="-1" dirty="0" smtClean="0">
+                <a:solidFill>
+                  <a:srgbClr val="333333"/>
+                </a:solidFill>
+                <a:uFill>
+                  <a:solidFill>
+                    <a:srgbClr val="FFFFFF"/>
+                  </a:solidFill>
+                </a:uFill>
+                <a:latin typeface="Arial"/>
+              </a:rPr>
+              <a:t>-Integration</a:t>
+            </a:r>
+            <a:r>
+              <a:rPr lang="de-DE" sz="2000" b="0" strike="noStrike" spc="-1" dirty="0" smtClean="0">
+                <a:solidFill>
+                  <a:srgbClr val="333333"/>
+                </a:solidFill>
+                <a:uFill>
+                  <a:solidFill>
+                    <a:srgbClr val="FFFFFF"/>
+                  </a:solidFill>
+                </a:uFill>
+                <a:latin typeface="Arial"/>
+              </a:rPr>
+              <a:t>, automatische Tests und </a:t>
+            </a:r>
+            <a:r>
+              <a:rPr lang="de-DE" sz="2000" b="0" strike="noStrike" spc="-1" dirty="0" err="1" smtClean="0">
+                <a:solidFill>
+                  <a:srgbClr val="333333"/>
+                </a:solidFill>
+                <a:uFill>
+                  <a:solidFill>
+                    <a:srgbClr val="FFFFFF"/>
+                  </a:solidFill>
+                </a:uFill>
+                <a:latin typeface="Arial"/>
+              </a:rPr>
+              <a:t>Javadoc</a:t>
+            </a:r>
+            <a:endParaRPr lang="de-DE" sz="2000" b="0" strike="noStrike" spc="-1" dirty="0" smtClean="0">
+              <a:solidFill>
+                <a:srgbClr val="333333"/>
+              </a:solidFill>
+              <a:uFill>
+                <a:solidFill>
+                  <a:srgbClr val="FFFFFF"/>
+                </a:solidFill>
+              </a:uFill>
+              <a:latin typeface="Arial"/>
+            </a:endParaRPr>
+          </a:p>
+          <a:p>
+            <a:pPr marL="181080" indent="-180360">
+              <a:lnSpc>
+                <a:spcPct val="100000"/>
+              </a:lnSpc>
+              <a:buClr>
+                <a:srgbClr val="333333"/>
+              </a:buClr>
+              <a:buFont typeface="Arial" pitchFamily="34" charset="0"/>
+              <a:buChar char="•"/>
+            </a:pPr>
+            <a:r>
+              <a:rPr lang="de-DE" sz="2000" spc="-1" dirty="0" smtClean="0">
+                <a:solidFill>
+                  <a:srgbClr val="333333"/>
+                </a:solidFill>
+                <a:uFill>
+                  <a:solidFill>
+                    <a:srgbClr val="FFFFFF"/>
+                  </a:solidFill>
+                </a:uFill>
+                <a:latin typeface="Arial"/>
+              </a:rPr>
+              <a:t>Kompilieren des Projekts mit </a:t>
+            </a:r>
+            <a:r>
+              <a:rPr lang="de-DE" sz="2000" spc="-1" dirty="0" err="1" smtClean="0">
+                <a:solidFill>
+                  <a:srgbClr val="333333"/>
+                </a:solidFill>
+                <a:uFill>
+                  <a:solidFill>
+                    <a:srgbClr val="FFFFFF"/>
+                  </a:solidFill>
+                </a:uFill>
+                <a:latin typeface="Arial"/>
+              </a:rPr>
+              <a:t>Maven</a:t>
+            </a:r>
+            <a:r>
+              <a:rPr lang="de-DE" sz="2000" spc="-1" dirty="0">
+                <a:solidFill>
+                  <a:srgbClr val="000000"/>
+                </a:solidFill>
+                <a:uFill>
+                  <a:solidFill>
+                    <a:srgbClr val="FFFFFF"/>
+                  </a:solidFill>
+                </a:uFill>
+                <a:latin typeface="Arial"/>
+              </a:rPr>
+              <a:t> </a:t>
+            </a:r>
+            <a:r>
+              <a:rPr lang="de-DE" sz="2000" spc="-1" dirty="0" smtClean="0">
+                <a:solidFill>
+                  <a:srgbClr val="000000"/>
+                </a:solidFill>
+                <a:uFill>
+                  <a:solidFill>
+                    <a:srgbClr val="FFFFFF"/>
+                  </a:solidFill>
+                </a:uFill>
+                <a:latin typeface="Arial"/>
+              </a:rPr>
+              <a:t>lokal oder im </a:t>
+            </a:r>
+            <a:r>
+              <a:rPr lang="de-DE" sz="2000" spc="-1" dirty="0" err="1" smtClean="0">
+                <a:solidFill>
+                  <a:srgbClr val="000000"/>
+                </a:solidFill>
+                <a:uFill>
+                  <a:solidFill>
+                    <a:srgbClr val="FFFFFF"/>
+                  </a:solidFill>
+                </a:uFill>
+                <a:latin typeface="Arial"/>
+              </a:rPr>
+              <a:t>GitLab</a:t>
+            </a:r>
+            <a:endParaRPr lang="de-DE" sz="2000" spc="-1" dirty="0" smtClean="0">
+              <a:solidFill>
+                <a:srgbClr val="000000"/>
+              </a:solidFill>
+              <a:uFill>
+                <a:solidFill>
+                  <a:srgbClr val="FFFFFF"/>
+                </a:solidFill>
+              </a:uFill>
+              <a:latin typeface="Arial"/>
+            </a:endParaRPr>
+          </a:p>
+          <a:p>
+            <a:pPr marL="181080" indent="-180360">
+              <a:lnSpc>
+                <a:spcPct val="100000"/>
+              </a:lnSpc>
+              <a:buClr>
+                <a:srgbClr val="333333"/>
+              </a:buClr>
+              <a:buFont typeface="Arial" pitchFamily="34" charset="0"/>
+              <a:buChar char="•"/>
+            </a:pPr>
+            <a:r>
+              <a:rPr lang="de-DE" sz="2000" spc="-1" dirty="0" smtClean="0">
+                <a:solidFill>
+                  <a:srgbClr val="000000"/>
+                </a:solidFill>
+                <a:uFill>
+                  <a:solidFill>
+                    <a:srgbClr val="FFFFFF"/>
+                  </a:solidFill>
+                </a:uFill>
+                <a:latin typeface="Arial"/>
+              </a:rPr>
+              <a:t>Tests mit </a:t>
+            </a:r>
+            <a:r>
+              <a:rPr lang="de-DE" sz="2000" spc="-1" dirty="0" err="1" smtClean="0">
+                <a:solidFill>
+                  <a:srgbClr val="000000"/>
+                </a:solidFill>
+                <a:uFill>
+                  <a:solidFill>
+                    <a:srgbClr val="FFFFFF"/>
+                  </a:solidFill>
+                </a:uFill>
+                <a:latin typeface="Arial"/>
+              </a:rPr>
+              <a:t>Junit</a:t>
+            </a:r>
+            <a:endParaRPr lang="de-DE" sz="2000" spc="-1" dirty="0" smtClean="0">
+              <a:solidFill>
+                <a:srgbClr val="000000"/>
+              </a:solidFill>
+              <a:uFill>
+                <a:solidFill>
+                  <a:srgbClr val="FFFFFF"/>
+                </a:solidFill>
+              </a:uFill>
+              <a:latin typeface="Arial"/>
+            </a:endParaRPr>
+          </a:p>
+          <a:p>
+            <a:pPr marL="181080" indent="-180360">
+              <a:lnSpc>
+                <a:spcPct val="100000"/>
+              </a:lnSpc>
+              <a:buClr>
+                <a:srgbClr val="333333"/>
+              </a:buClr>
+              <a:buFont typeface="Arial" pitchFamily="34" charset="0"/>
+              <a:buChar char="•"/>
+            </a:pPr>
+            <a:r>
+              <a:rPr lang="de-DE" sz="2000" spc="-1" dirty="0" smtClean="0">
+                <a:solidFill>
+                  <a:srgbClr val="000000"/>
+                </a:solidFill>
+                <a:uFill>
+                  <a:solidFill>
+                    <a:srgbClr val="FFFFFF"/>
+                  </a:solidFill>
+                </a:uFill>
+                <a:latin typeface="Arial"/>
+              </a:rPr>
+              <a:t>Dokumentation des Projekts mit </a:t>
+            </a:r>
+            <a:r>
+              <a:rPr lang="de-DE" sz="2000" spc="-1" dirty="0" err="1" smtClean="0">
+                <a:solidFill>
+                  <a:srgbClr val="000000"/>
+                </a:solidFill>
+                <a:uFill>
+                  <a:solidFill>
+                    <a:srgbClr val="FFFFFF"/>
+                  </a:solidFill>
+                </a:uFill>
+                <a:latin typeface="Arial"/>
+              </a:rPr>
+              <a:t>Javadoc</a:t>
+            </a:r>
+            <a:endParaRPr lang="de-DE" sz="2000" spc="-1" dirty="0" smtClean="0">
               <a:solidFill>
                 <a:srgbClr val="000000"/>
               </a:solidFill>
@@ -10840,7 +11431,7 @@
       </p:grpSpPr>
       <p:sp>
         <p:nvSpPr>
-          <p:cNvPr id="187" name="CustomShape 1"/>
+          <p:cNvPr id="174" name="CustomShape 1"/>
           <p:cNvSpPr/>
           <p:nvPr/>
         </p:nvSpPr>
@@ -10873,7 +11464,7 @@
           <a:bodyPr lIns="0" tIns="0" rIns="0" bIns="0" anchor="b"/>
           <a:lstStyle/>
           <a:p>
-            <a:pPr algn="ctr">
+            <a:pPr>
               <a:lnSpc>
                 <a:spcPct val="100000"/>
               </a:lnSpc>
@@ -10890,7 +11481,7 @@
                 </a:uFill>
                 <a:latin typeface="Arial"/>
               </a:rPr>
-              <a:t>Live Präsentation</a:t>
+              <a:t>GUI</a:t>
             </a:r>
             <a:endParaRPr lang="de-DE" sz="1800" b="0" strike="noStrike" spc="-1">
               <a:solidFill>
@@ -10908,71 +11499,28 @@
       </p:sp>
       <p:pic>
         <p:nvPicPr>
-          <p:cNvPr id="188" name="Inhaltsplatzhalter 1"/>
-          <p:cNvPicPr/>
+          <p:cNvPr id="1026" name="Picture 2" descr="G:\Philipp\Desktop\javadocPNG.PNG"/>
+          <p:cNvPicPr>
+            <a:picLocks noChangeAspect="1" noChangeArrowheads="1"/>
+          </p:cNvPicPr>
           <p:nvPr/>
         </p:nvPicPr>
         <p:blipFill>
           <a:blip r:embed="rId2" cstate="print"/>
-          <a:stretch/>
+          <a:srcRect/>
+          <a:stretch>
+            <a:fillRect/>
+          </a:stretch>
         </p:blipFill>
-        <p:spPr>
-          <a:xfrm>
-            <a:off x="2267640" y="1999800"/>
-            <a:ext cx="3564720" cy="3658320"/>
-          </a:xfrm>
-          <a:prstGeom prst="rect">
-            <a:avLst/>
-          </a:prstGeom>
-          <a:ln>
-            <a:noFill/>
-          </a:ln>
-        </p:spPr>
-      </p:pic>
-      <p:pic>
-        <p:nvPicPr>
-          <p:cNvPr id="189" name="Bild 2"/>
-          <p:cNvPicPr/>
-          <p:nvPr/>
-        </p:nvPicPr>
-        <p:blipFill>
-          <a:blip r:embed="rId3" cstate="print"/>
-          <a:stretch/>
-        </p:blipFill>
-        <p:spPr>
-          <a:xfrm>
-            <a:off x="611640" y="2768040"/>
-            <a:ext cx="1267920" cy="2435400"/>
-          </a:xfrm>
-          <a:prstGeom prst="rect">
-            <a:avLst/>
-          </a:prstGeom>
-          <a:ln>
-            <a:noFill/>
-          </a:ln>
-        </p:spPr>
-      </p:pic>
-      <p:pic>
-        <p:nvPicPr>
-          <p:cNvPr id="190" name="Bild 4"/>
-          <p:cNvPicPr/>
-          <p:nvPr/>
-        </p:nvPicPr>
-        <p:blipFill>
-          <a:blip r:embed="rId4" cstate="print"/>
-          <a:stretch/>
-        </p:blipFill>
-        <p:spPr>
-          <a:xfrm>
-            <a:off x="5833440" y="2925000"/>
-            <a:ext cx="3170520" cy="2121840"/>
-          </a:xfrm>
-          <a:prstGeom prst="rect">
-            <a:avLst/>
-          </a:prstGeom>
-          <a:ln>
-            <a:noFill/>
-          </a:ln>
+        <p:spPr bwMode="auto">
+          <a:xfrm>
+            <a:off x="683568" y="1628800"/>
+            <a:ext cx="8001416" cy="4784948"/>
+          </a:xfrm>
+          <a:prstGeom prst="rect">
+            <a:avLst/>
+          </a:prstGeom>
+          <a:noFill/>
         </p:spPr>
       </p:pic>
     </p:spTree>
@@ -11011,6 +11559,887 @@
 </file>
 
 <file path=ppt/slides/slide23.xml><?xml version="1.0" encoding="utf-8"?>
+<p:sld xmlns:a="http://schemas.openxmlformats.org/drawingml/2006/main" xmlns:r="http://schemas.openxmlformats.org/officeDocument/2006/relationships" xmlns:p="http://schemas.openxmlformats.org/presentationml/2006/main">
+  <p:cSld>
+    <p:spTree>
+      <p:nvGrpSpPr>
+        <p:cNvPr id="1" name=""/>
+        <p:cNvGrpSpPr/>
+        <p:nvPr/>
+      </p:nvGrpSpPr>
+      <p:grpSpPr>
+        <a:xfrm>
+          <a:off x="0" y="0"/>
+          <a:ext cx="0" cy="0"/>
+          <a:chOff x="0" y="0"/>
+          <a:chExt cx="0" cy="0"/>
+        </a:xfrm>
+      </p:grpSpPr>
+      <p:sp>
+        <p:nvSpPr>
+          <p:cNvPr id="178" name="CustomShape 1"/>
+          <p:cNvSpPr/>
+          <p:nvPr/>
+        </p:nvSpPr>
+        <p:spPr>
+          <a:xfrm>
+            <a:off x="719280" y="1288080"/>
+            <a:ext cx="7700400" cy="368640"/>
+          </a:xfrm>
+          <a:prstGeom prst="rect">
+            <a:avLst/>
+          </a:prstGeom>
+          <a:noFill/>
+          <a:ln>
+            <a:noFill/>
+          </a:ln>
+        </p:spPr>
+        <p:style>
+          <a:lnRef idx="0">
+            <a:scrgbClr r="0" g="0" b="0"/>
+          </a:lnRef>
+          <a:fillRef idx="0">
+            <a:scrgbClr r="0" g="0" b="0"/>
+          </a:fillRef>
+          <a:effectRef idx="0">
+            <a:scrgbClr r="0" g="0" b="0"/>
+          </a:effectRef>
+          <a:fontRef idx="minor"/>
+        </p:style>
+        <p:txBody>
+          <a:bodyPr lIns="0" tIns="0" rIns="0" bIns="0" anchor="b"/>
+          <a:lstStyle/>
+          <a:p>
+            <a:pPr>
+              <a:lnSpc>
+                <a:spcPct val="100000"/>
+              </a:lnSpc>
+            </a:pPr>
+            <a:r>
+              <a:rPr lang="de-DE" sz="2400" b="1" strike="noStrike" spc="-1">
+                <a:solidFill>
+                  <a:srgbClr val="2D2015"/>
+                </a:solidFill>
+                <a:uFill>
+                  <a:solidFill>
+                    <a:srgbClr val="FFFFFF"/>
+                  </a:solidFill>
+                </a:uFill>
+                <a:latin typeface="Arial"/>
+              </a:rPr>
+              <a:t>Datenbanken	</a:t>
+            </a:r>
+            <a:endParaRPr lang="de-DE" sz="1800" b="0" strike="noStrike" spc="-1">
+              <a:solidFill>
+                <a:srgbClr val="000000"/>
+              </a:solidFill>
+              <a:uFill>
+                <a:solidFill>
+                  <a:srgbClr val="FFFFFF"/>
+                </a:solidFill>
+              </a:uFill>
+              <a:latin typeface="Arial"/>
+            </a:endParaRPr>
+          </a:p>
+        </p:txBody>
+      </p:sp>
+      <p:pic>
+        <p:nvPicPr>
+          <p:cNvPr id="179" name="Bild 4"/>
+          <p:cNvPicPr/>
+          <p:nvPr/>
+        </p:nvPicPr>
+        <p:blipFill>
+          <a:blip r:embed="rId2" cstate="print"/>
+          <a:stretch/>
+        </p:blipFill>
+        <p:spPr>
+          <a:xfrm>
+            <a:off x="5192280" y="2133000"/>
+            <a:ext cx="2887560" cy="2928600"/>
+          </a:xfrm>
+          <a:prstGeom prst="rect">
+            <a:avLst/>
+          </a:prstGeom>
+          <a:ln>
+            <a:noFill/>
+          </a:ln>
+        </p:spPr>
+      </p:pic>
+      <p:pic>
+        <p:nvPicPr>
+          <p:cNvPr id="180" name="Bild 8"/>
+          <p:cNvPicPr/>
+          <p:nvPr/>
+        </p:nvPicPr>
+        <p:blipFill>
+          <a:blip r:embed="rId3" cstate="print"/>
+          <a:stretch/>
+        </p:blipFill>
+        <p:spPr>
+          <a:xfrm>
+            <a:off x="4612680" y="1202760"/>
+            <a:ext cx="1386360" cy="716760"/>
+          </a:xfrm>
+          <a:prstGeom prst="rect">
+            <a:avLst/>
+          </a:prstGeom>
+          <a:ln>
+            <a:noFill/>
+          </a:ln>
+        </p:spPr>
+      </p:pic>
+      <p:pic>
+        <p:nvPicPr>
+          <p:cNvPr id="181" name="Bild 9"/>
+          <p:cNvPicPr/>
+          <p:nvPr/>
+        </p:nvPicPr>
+        <p:blipFill>
+          <a:blip r:embed="rId4" cstate="print"/>
+          <a:stretch/>
+        </p:blipFill>
+        <p:spPr>
+          <a:xfrm>
+            <a:off x="7718760" y="5105520"/>
+            <a:ext cx="722520" cy="722520"/>
+          </a:xfrm>
+          <a:prstGeom prst="rect">
+            <a:avLst/>
+          </a:prstGeom>
+          <a:ln>
+            <a:noFill/>
+          </a:ln>
+        </p:spPr>
+      </p:pic>
+    </p:spTree>
+  </p:cSld>
+  <p:clrMapOvr>
+    <a:masterClrMapping/>
+  </p:clrMapOvr>
+  <p:timing>
+    <p:tnLst>
+      <p:par>
+        <p:cTn id="1" dur="indefinite" restart="never" nodeType="tmRoot">
+          <p:childTnLst>
+            <p:seq>
+              <p:cTn id="2" nodeType="mainSeq"/>
+              <p:prevCondLst>
+                <p:cond evt="onPrev" delay="0">
+                  <p:tgtEl>
+                    <p:sldTgt/>
+                  </p:tgtEl>
+                </p:cond>
+              </p:prevCondLst>
+              <p:nextCondLst>
+                <p:cond evt="onNext" delay="0">
+                  <p:tgtEl>
+                    <p:sldTgt/>
+                  </p:tgtEl>
+                </p:cond>
+              </p:nextCondLst>
+            </p:seq>
+          </p:childTnLst>
+        </p:cTn>
+      </p:par>
+    </p:tnLst>
+  </p:timing>
+</p:sld>
+</file>
+
+<file path=ppt/slides/slide24.xml><?xml version="1.0" encoding="utf-8"?>
+<p:sld xmlns:a="http://schemas.openxmlformats.org/drawingml/2006/main" xmlns:r="http://schemas.openxmlformats.org/officeDocument/2006/relationships" xmlns:p="http://schemas.openxmlformats.org/presentationml/2006/main">
+  <p:cSld>
+    <p:spTree>
+      <p:nvGrpSpPr>
+        <p:cNvPr id="1" name=""/>
+        <p:cNvGrpSpPr/>
+        <p:nvPr/>
+      </p:nvGrpSpPr>
+      <p:grpSpPr>
+        <a:xfrm>
+          <a:off x="0" y="0"/>
+          <a:ext cx="0" cy="0"/>
+          <a:chOff x="0" y="0"/>
+          <a:chExt cx="0" cy="0"/>
+        </a:xfrm>
+      </p:grpSpPr>
+      <p:sp>
+        <p:nvSpPr>
+          <p:cNvPr id="182" name="CustomShape 1"/>
+          <p:cNvSpPr/>
+          <p:nvPr/>
+        </p:nvSpPr>
+        <p:spPr>
+          <a:xfrm>
+            <a:off x="719280" y="1288080"/>
+            <a:ext cx="7700400" cy="368640"/>
+          </a:xfrm>
+          <a:prstGeom prst="rect">
+            <a:avLst/>
+          </a:prstGeom>
+          <a:noFill/>
+          <a:ln>
+            <a:noFill/>
+          </a:ln>
+        </p:spPr>
+        <p:style>
+          <a:lnRef idx="0">
+            <a:scrgbClr r="0" g="0" b="0"/>
+          </a:lnRef>
+          <a:fillRef idx="0">
+            <a:scrgbClr r="0" g="0" b="0"/>
+          </a:fillRef>
+          <a:effectRef idx="0">
+            <a:scrgbClr r="0" g="0" b="0"/>
+          </a:effectRef>
+          <a:fontRef idx="minor"/>
+        </p:style>
+        <p:txBody>
+          <a:bodyPr lIns="0" tIns="0" rIns="0" bIns="0" anchor="b"/>
+          <a:lstStyle/>
+          <a:p>
+            <a:pPr>
+              <a:lnSpc>
+                <a:spcPct val="100000"/>
+              </a:lnSpc>
+            </a:pPr>
+            <a:r>
+              <a:rPr lang="de-DE" sz="2400" b="1" strike="noStrike" spc="-1">
+                <a:solidFill>
+                  <a:srgbClr val="2D2015"/>
+                </a:solidFill>
+                <a:uFill>
+                  <a:solidFill>
+                    <a:srgbClr val="FFFFFF"/>
+                  </a:solidFill>
+                </a:uFill>
+                <a:latin typeface="Arial"/>
+              </a:rPr>
+              <a:t>Applikation</a:t>
+            </a:r>
+            <a:endParaRPr lang="de-DE" sz="1800" b="0" strike="noStrike" spc="-1">
+              <a:solidFill>
+                <a:srgbClr val="000000"/>
+              </a:solidFill>
+              <a:uFill>
+                <a:solidFill>
+                  <a:srgbClr val="FFFFFF"/>
+                </a:solidFill>
+              </a:uFill>
+              <a:latin typeface="Arial"/>
+            </a:endParaRPr>
+          </a:p>
+        </p:txBody>
+      </p:sp>
+      <p:sp>
+        <p:nvSpPr>
+          <p:cNvPr id="183" name="CustomShape 2"/>
+          <p:cNvSpPr/>
+          <p:nvPr/>
+        </p:nvSpPr>
+        <p:spPr>
+          <a:xfrm>
+            <a:off x="719280" y="1773360"/>
+            <a:ext cx="7705080" cy="4352040"/>
+          </a:xfrm>
+          <a:prstGeom prst="rect">
+            <a:avLst/>
+          </a:prstGeom>
+          <a:noFill/>
+          <a:ln>
+            <a:noFill/>
+          </a:ln>
+        </p:spPr>
+        <p:style>
+          <a:lnRef idx="0">
+            <a:scrgbClr r="0" g="0" b="0"/>
+          </a:lnRef>
+          <a:fillRef idx="0">
+            <a:scrgbClr r="0" g="0" b="0"/>
+          </a:fillRef>
+          <a:effectRef idx="0">
+            <a:scrgbClr r="0" g="0" b="0"/>
+          </a:effectRef>
+          <a:fontRef idx="minor"/>
+        </p:style>
+        <p:txBody>
+          <a:bodyPr lIns="0" tIns="0" rIns="0" bIns="0"/>
+          <a:lstStyle/>
+          <a:p>
+            <a:pPr>
+              <a:lnSpc>
+                <a:spcPct val="100000"/>
+              </a:lnSpc>
+            </a:pPr>
+            <a:r>
+              <a:rPr lang="de-DE" sz="2000" b="0" strike="noStrike" spc="-1">
+                <a:solidFill>
+                  <a:srgbClr val="333333"/>
+                </a:solidFill>
+                <a:uFill>
+                  <a:solidFill>
+                    <a:srgbClr val="FFFFFF"/>
+                  </a:solidFill>
+                </a:uFill>
+                <a:latin typeface="Arial"/>
+              </a:rPr>
+              <a:t>Funktionen:</a:t>
+            </a:r>
+            <a:endParaRPr lang="de-DE" sz="1800" b="0" strike="noStrike" spc="-1">
+              <a:solidFill>
+                <a:srgbClr val="000000"/>
+              </a:solidFill>
+              <a:uFill>
+                <a:solidFill>
+                  <a:srgbClr val="FFFFFF"/>
+                </a:solidFill>
+              </a:uFill>
+              <a:latin typeface="Arial"/>
+            </a:endParaRPr>
+          </a:p>
+          <a:p>
+            <a:pPr marL="181080" indent="-180360">
+              <a:lnSpc>
+                <a:spcPct val="100000"/>
+              </a:lnSpc>
+              <a:buClr>
+                <a:srgbClr val="333333"/>
+              </a:buClr>
+              <a:buFont typeface="Symbol"/>
+              <a:buChar char=""/>
+            </a:pPr>
+            <a:r>
+              <a:rPr lang="de-DE" sz="2000" b="0" strike="noStrike" spc="-1">
+                <a:solidFill>
+                  <a:srgbClr val="333333"/>
+                </a:solidFill>
+                <a:uFill>
+                  <a:solidFill>
+                    <a:srgbClr val="FFFFFF"/>
+                  </a:solidFill>
+                </a:uFill>
+                <a:latin typeface="Arial"/>
+              </a:rPr>
+              <a:t>Motor starten/stoppen</a:t>
+            </a:r>
+            <a:endParaRPr lang="de-DE" sz="1800" b="0" strike="noStrike" spc="-1">
+              <a:solidFill>
+                <a:srgbClr val="000000"/>
+              </a:solidFill>
+              <a:uFill>
+                <a:solidFill>
+                  <a:srgbClr val="FFFFFF"/>
+                </a:solidFill>
+              </a:uFill>
+              <a:latin typeface="Arial"/>
+            </a:endParaRPr>
+          </a:p>
+          <a:p>
+            <a:pPr marL="181080" indent="-180360">
+              <a:lnSpc>
+                <a:spcPct val="100000"/>
+              </a:lnSpc>
+              <a:buClr>
+                <a:srgbClr val="333333"/>
+              </a:buClr>
+              <a:buFont typeface="Symbol"/>
+              <a:buChar char=""/>
+            </a:pPr>
+            <a:r>
+              <a:rPr lang="de-DE" sz="2000" b="0" strike="noStrike" spc="-1">
+                <a:solidFill>
+                  <a:srgbClr val="333333"/>
+                </a:solidFill>
+                <a:uFill>
+                  <a:solidFill>
+                    <a:srgbClr val="FFFFFF"/>
+                  </a:solidFill>
+                </a:uFill>
+                <a:latin typeface="Arial"/>
+              </a:rPr>
+              <a:t>Rotortest</a:t>
+            </a:r>
+            <a:endParaRPr lang="de-DE" sz="1800" b="0" strike="noStrike" spc="-1">
+              <a:solidFill>
+                <a:srgbClr val="000000"/>
+              </a:solidFill>
+              <a:uFill>
+                <a:solidFill>
+                  <a:srgbClr val="FFFFFF"/>
+                </a:solidFill>
+              </a:uFill>
+              <a:latin typeface="Arial"/>
+            </a:endParaRPr>
+          </a:p>
+          <a:p>
+            <a:pPr marL="181080" indent="-180360">
+              <a:lnSpc>
+                <a:spcPct val="100000"/>
+              </a:lnSpc>
+              <a:buClr>
+                <a:srgbClr val="333333"/>
+              </a:buClr>
+              <a:buFont typeface="Symbol"/>
+              <a:buChar char=""/>
+            </a:pPr>
+            <a:r>
+              <a:rPr lang="de-DE" sz="2000" b="0" strike="noStrike" spc="-1">
+                <a:solidFill>
+                  <a:srgbClr val="333333"/>
+                </a:solidFill>
+                <a:uFill>
+                  <a:solidFill>
+                    <a:srgbClr val="FFFFFF"/>
+                  </a:solidFill>
+                </a:uFill>
+                <a:latin typeface="Arial"/>
+              </a:rPr>
+              <a:t>Einzelansteuerung der Rotoren</a:t>
+            </a:r>
+            <a:endParaRPr lang="de-DE" sz="1800" b="0" strike="noStrike" spc="-1">
+              <a:solidFill>
+                <a:srgbClr val="000000"/>
+              </a:solidFill>
+              <a:uFill>
+                <a:solidFill>
+                  <a:srgbClr val="FFFFFF"/>
+                </a:solidFill>
+              </a:uFill>
+              <a:latin typeface="Arial"/>
+            </a:endParaRPr>
+          </a:p>
+          <a:p>
+            <a:pPr marL="181080" indent="-180360">
+              <a:lnSpc>
+                <a:spcPct val="100000"/>
+              </a:lnSpc>
+              <a:buClr>
+                <a:srgbClr val="333333"/>
+              </a:buClr>
+              <a:buFont typeface="Symbol"/>
+              <a:buChar char=""/>
+            </a:pPr>
+            <a:r>
+              <a:rPr lang="de-DE" sz="2000" b="0" strike="noStrike" spc="-1">
+                <a:solidFill>
+                  <a:srgbClr val="333333"/>
+                </a:solidFill>
+                <a:uFill>
+                  <a:solidFill>
+                    <a:srgbClr val="FFFFFF"/>
+                  </a:solidFill>
+                </a:uFill>
+                <a:latin typeface="Arial"/>
+              </a:rPr>
+              <a:t>Demo</a:t>
+            </a:r>
+            <a:endParaRPr lang="de-DE" sz="1800" b="0" strike="noStrike" spc="-1">
+              <a:solidFill>
+                <a:srgbClr val="000000"/>
+              </a:solidFill>
+              <a:uFill>
+                <a:solidFill>
+                  <a:srgbClr val="FFFFFF"/>
+                </a:solidFill>
+              </a:uFill>
+              <a:latin typeface="Arial"/>
+            </a:endParaRPr>
+          </a:p>
+        </p:txBody>
+      </p:sp>
+      <p:pic>
+        <p:nvPicPr>
+          <p:cNvPr id="184" name="Bild 3"/>
+          <p:cNvPicPr/>
+          <p:nvPr/>
+        </p:nvPicPr>
+        <p:blipFill>
+          <a:blip r:embed="rId2" cstate="print"/>
+          <a:stretch/>
+        </p:blipFill>
+        <p:spPr>
+          <a:xfrm>
+            <a:off x="6012000" y="1364760"/>
+            <a:ext cx="1945800" cy="3737520"/>
+          </a:xfrm>
+          <a:prstGeom prst="rect">
+            <a:avLst/>
+          </a:prstGeom>
+          <a:ln>
+            <a:noFill/>
+          </a:ln>
+        </p:spPr>
+      </p:pic>
+      <p:pic>
+        <p:nvPicPr>
+          <p:cNvPr id="185" name="Bild 4"/>
+          <p:cNvPicPr/>
+          <p:nvPr/>
+        </p:nvPicPr>
+        <p:blipFill>
+          <a:blip r:embed="rId3" cstate="print"/>
+          <a:srcRect l="10601" r="18819"/>
+          <a:stretch/>
+        </p:blipFill>
+        <p:spPr>
+          <a:xfrm>
+            <a:off x="2051640" y="4077000"/>
+            <a:ext cx="2159280" cy="1717200"/>
+          </a:xfrm>
+          <a:prstGeom prst="rect">
+            <a:avLst/>
+          </a:prstGeom>
+          <a:ln>
+            <a:noFill/>
+          </a:ln>
+        </p:spPr>
+      </p:pic>
+    </p:spTree>
+  </p:cSld>
+  <p:clrMapOvr>
+    <a:masterClrMapping/>
+  </p:clrMapOvr>
+  <p:timing>
+    <p:tnLst>
+      <p:par>
+        <p:cTn id="1" dur="indefinite" restart="never" nodeType="tmRoot">
+          <p:childTnLst>
+            <p:seq>
+              <p:cTn id="2" nodeType="mainSeq"/>
+              <p:prevCondLst>
+                <p:cond evt="onPrev" delay="0">
+                  <p:tgtEl>
+                    <p:sldTgt/>
+                  </p:tgtEl>
+                </p:cond>
+              </p:prevCondLst>
+              <p:nextCondLst>
+                <p:cond evt="onNext" delay="0">
+                  <p:tgtEl>
+                    <p:sldTgt/>
+                  </p:tgtEl>
+                </p:cond>
+              </p:nextCondLst>
+            </p:seq>
+          </p:childTnLst>
+        </p:cTn>
+      </p:par>
+    </p:tnLst>
+  </p:timing>
+</p:sld>
+</file>
+
+<file path=ppt/slides/slide25.xml><?xml version="1.0" encoding="utf-8"?>
+<p:sld xmlns:a="http://schemas.openxmlformats.org/drawingml/2006/main" xmlns:r="http://schemas.openxmlformats.org/officeDocument/2006/relationships" xmlns:p="http://schemas.openxmlformats.org/presentationml/2006/main">
+  <p:cSld>
+    <p:spTree>
+      <p:nvGrpSpPr>
+        <p:cNvPr id="1" name=""/>
+        <p:cNvGrpSpPr/>
+        <p:nvPr/>
+      </p:nvGrpSpPr>
+      <p:grpSpPr>
+        <a:xfrm>
+          <a:off x="0" y="0"/>
+          <a:ext cx="0" cy="0"/>
+          <a:chOff x="0" y="0"/>
+          <a:chExt cx="0" cy="0"/>
+        </a:xfrm>
+      </p:grpSpPr>
+      <p:sp>
+        <p:nvSpPr>
+          <p:cNvPr id="186" name="CustomShape 1"/>
+          <p:cNvSpPr/>
+          <p:nvPr/>
+        </p:nvSpPr>
+        <p:spPr>
+          <a:xfrm>
+            <a:off x="683640" y="3069000"/>
+            <a:ext cx="7700400" cy="368640"/>
+          </a:xfrm>
+          <a:prstGeom prst="rect">
+            <a:avLst/>
+          </a:prstGeom>
+          <a:noFill/>
+          <a:ln>
+            <a:noFill/>
+          </a:ln>
+        </p:spPr>
+        <p:style>
+          <a:lnRef idx="0">
+            <a:scrgbClr r="0" g="0" b="0"/>
+          </a:lnRef>
+          <a:fillRef idx="0">
+            <a:scrgbClr r="0" g="0" b="0"/>
+          </a:fillRef>
+          <a:effectRef idx="0">
+            <a:scrgbClr r="0" g="0" b="0"/>
+          </a:effectRef>
+          <a:fontRef idx="minor"/>
+        </p:style>
+        <p:txBody>
+          <a:bodyPr lIns="0" tIns="0" rIns="0" bIns="0" anchor="b"/>
+          <a:lstStyle/>
+          <a:p>
+            <a:pPr algn="ctr">
+              <a:lnSpc>
+                <a:spcPct val="100000"/>
+              </a:lnSpc>
+            </a:pPr>
+            <a:r>
+              <a:rPr lang="de-DE" sz="2400" b="1" strike="noStrike" spc="-1">
+                <a:solidFill>
+                  <a:srgbClr val="2D2015"/>
+                </a:solidFill>
+                <a:uFill>
+                  <a:solidFill>
+                    <a:srgbClr val="FFFFFF"/>
+                  </a:solidFill>
+                </a:uFill>
+                <a:latin typeface="Arial"/>
+              </a:rPr>
+              <a:t>Fragen?</a:t>
+            </a:r>
+            <a:endParaRPr lang="de-DE" sz="1800" b="0" strike="noStrike" spc="-1">
+              <a:solidFill>
+                <a:srgbClr val="000000"/>
+              </a:solidFill>
+              <a:uFill>
+                <a:solidFill>
+                  <a:srgbClr val="FFFFFF"/>
+                </a:solidFill>
+              </a:uFill>
+              <a:latin typeface="Arial"/>
+            </a:endParaRPr>
+          </a:p>
+        </p:txBody>
+      </p:sp>
+    </p:spTree>
+  </p:cSld>
+  <p:clrMapOvr>
+    <a:masterClrMapping/>
+  </p:clrMapOvr>
+  <p:timing>
+    <p:tnLst>
+      <p:par>
+        <p:cTn id="1" dur="indefinite" restart="never" nodeType="tmRoot">
+          <p:childTnLst>
+            <p:seq>
+              <p:cTn id="2" nodeType="mainSeq"/>
+              <p:prevCondLst>
+                <p:cond evt="onPrev" delay="0">
+                  <p:tgtEl>
+                    <p:sldTgt/>
+                  </p:tgtEl>
+                </p:cond>
+              </p:prevCondLst>
+              <p:nextCondLst>
+                <p:cond evt="onNext" delay="0">
+                  <p:tgtEl>
+                    <p:sldTgt/>
+                  </p:tgtEl>
+                </p:cond>
+              </p:nextCondLst>
+            </p:seq>
+          </p:childTnLst>
+        </p:cTn>
+      </p:par>
+    </p:tnLst>
+  </p:timing>
+</p:sld>
+</file>
+
+<file path=ppt/slides/slide26.xml><?xml version="1.0" encoding="utf-8"?>
+<p:sld xmlns:a="http://schemas.openxmlformats.org/drawingml/2006/main" xmlns:r="http://schemas.openxmlformats.org/officeDocument/2006/relationships" xmlns:p="http://schemas.openxmlformats.org/presentationml/2006/main">
+  <p:cSld>
+    <p:spTree>
+      <p:nvGrpSpPr>
+        <p:cNvPr id="1" name=""/>
+        <p:cNvGrpSpPr/>
+        <p:nvPr/>
+      </p:nvGrpSpPr>
+      <p:grpSpPr>
+        <a:xfrm>
+          <a:off x="0" y="0"/>
+          <a:ext cx="0" cy="0"/>
+          <a:chOff x="0" y="0"/>
+          <a:chExt cx="0" cy="0"/>
+        </a:xfrm>
+      </p:grpSpPr>
+      <p:sp>
+        <p:nvSpPr>
+          <p:cNvPr id="187" name="CustomShape 1"/>
+          <p:cNvSpPr/>
+          <p:nvPr/>
+        </p:nvSpPr>
+        <p:spPr>
+          <a:xfrm>
+            <a:off x="719280" y="1288080"/>
+            <a:ext cx="7700400" cy="368640"/>
+          </a:xfrm>
+          <a:prstGeom prst="rect">
+            <a:avLst/>
+          </a:prstGeom>
+          <a:noFill/>
+          <a:ln>
+            <a:noFill/>
+          </a:ln>
+        </p:spPr>
+        <p:style>
+          <a:lnRef idx="0">
+            <a:scrgbClr r="0" g="0" b="0"/>
+          </a:lnRef>
+          <a:fillRef idx="0">
+            <a:scrgbClr r="0" g="0" b="0"/>
+          </a:fillRef>
+          <a:effectRef idx="0">
+            <a:scrgbClr r="0" g="0" b="0"/>
+          </a:effectRef>
+          <a:fontRef idx="minor"/>
+        </p:style>
+        <p:txBody>
+          <a:bodyPr lIns="0" tIns="0" rIns="0" bIns="0" anchor="b"/>
+          <a:lstStyle/>
+          <a:p>
+            <a:pPr algn="ctr">
+              <a:lnSpc>
+                <a:spcPct val="100000"/>
+              </a:lnSpc>
+            </a:pPr>
+            <a:r>
+              <a:rPr lang="de-DE" sz="2400" b="1" strike="noStrike" spc="-1">
+                <a:solidFill>
+                  <a:srgbClr val="2D2015"/>
+                </a:solidFill>
+                <a:uFill>
+                  <a:solidFill>
+                    <a:srgbClr val="FFFFFF"/>
+                  </a:solidFill>
+                </a:uFill>
+                <a:latin typeface="Arial"/>
+              </a:rPr>
+              <a:t>Live Präsentation</a:t>
+            </a:r>
+            <a:endParaRPr lang="de-DE" sz="1800" b="0" strike="noStrike" spc="-1">
+              <a:solidFill>
+                <a:srgbClr val="000000"/>
+              </a:solidFill>
+              <a:uFill>
+                <a:solidFill>
+                  <a:srgbClr val="FFFFFF"/>
+                </a:solidFill>
+              </a:uFill>
+              <a:latin typeface="Arial"/>
+            </a:endParaRPr>
+          </a:p>
+        </p:txBody>
+      </p:sp>
+      <p:pic>
+        <p:nvPicPr>
+          <p:cNvPr id="188" name="Inhaltsplatzhalter 1"/>
+          <p:cNvPicPr/>
+          <p:nvPr/>
+        </p:nvPicPr>
+        <p:blipFill>
+          <a:blip r:embed="rId2" cstate="print"/>
+          <a:stretch/>
+        </p:blipFill>
+        <p:spPr>
+          <a:xfrm>
+            <a:off x="2267640" y="1999800"/>
+            <a:ext cx="3564720" cy="3658320"/>
+          </a:xfrm>
+          <a:prstGeom prst="rect">
+            <a:avLst/>
+          </a:prstGeom>
+          <a:ln>
+            <a:noFill/>
+          </a:ln>
+        </p:spPr>
+      </p:pic>
+      <p:pic>
+        <p:nvPicPr>
+          <p:cNvPr id="189" name="Bild 2"/>
+          <p:cNvPicPr/>
+          <p:nvPr/>
+        </p:nvPicPr>
+        <p:blipFill>
+          <a:blip r:embed="rId3" cstate="print"/>
+          <a:stretch/>
+        </p:blipFill>
+        <p:spPr>
+          <a:xfrm>
+            <a:off x="611640" y="2768040"/>
+            <a:ext cx="1267920" cy="2435400"/>
+          </a:xfrm>
+          <a:prstGeom prst="rect">
+            <a:avLst/>
+          </a:prstGeom>
+          <a:ln>
+            <a:noFill/>
+          </a:ln>
+        </p:spPr>
+      </p:pic>
+      <p:pic>
+        <p:nvPicPr>
+          <p:cNvPr id="190" name="Bild 4"/>
+          <p:cNvPicPr/>
+          <p:nvPr/>
+        </p:nvPicPr>
+        <p:blipFill>
+          <a:blip r:embed="rId4" cstate="print"/>
+          <a:stretch/>
+        </p:blipFill>
+        <p:spPr>
+          <a:xfrm>
+            <a:off x="5833440" y="2925000"/>
+            <a:ext cx="3170520" cy="2121840"/>
+          </a:xfrm>
+          <a:prstGeom prst="rect">
+            <a:avLst/>
+          </a:prstGeom>
+          <a:ln>
+            <a:noFill/>
+          </a:ln>
+        </p:spPr>
+      </p:pic>
+    </p:spTree>
+  </p:cSld>
+  <p:clrMapOvr>
+    <a:masterClrMapping/>
+  </p:clrMapOvr>
+  <p:timing>
+    <p:tnLst>
+      <p:par>
+        <p:cTn id="1" dur="indefinite" restart="never" nodeType="tmRoot">
+          <p:childTnLst>
+            <p:seq>
+              <p:cTn id="2" nodeType="mainSeq"/>
+              <p:prevCondLst>
+                <p:cond evt="onPrev" delay="0">
+                  <p:tgtEl>
+                    <p:sldTgt/>
+                  </p:tgtEl>
+                </p:cond>
+              </p:prevCondLst>
+              <p:nextCondLst>
+                <p:cond evt="onNext" delay="0">
+                  <p:tgtEl>
+                    <p:sldTgt/>
+                  </p:tgtEl>
+                </p:cond>
+              </p:nextCondLst>
+            </p:seq>
+          </p:childTnLst>
+        </p:cTn>
+      </p:par>
+    </p:tnLst>
+  </p:timing>
+</p:sld>
+</file>
+
+<file path=ppt/slides/slide27.xml><?xml version="1.0" encoding="utf-8"?>
 <p:sld xmlns:a="http://schemas.openxmlformats.org/drawingml/2006/main" xmlns:r="http://schemas.openxmlformats.org/officeDocument/2006/relationships" xmlns:p="http://schemas.openxmlformats.org/presentationml/2006/main">
   <p:cSld>
     <p:spTree>

</xml_diff>